<commit_message>
JUnit fix PPTX added
Signed-off-by: Emil Elkjær Nielsen <emil@visiontrade.dk>
</commit_message>
<xml_diff>
--- a/Præsentation.pptx
+++ b/Præsentation.pptx
@@ -5,7 +5,7 @@
     <p:sldMasterId id="2147483660" r:id="rId4"/>
   </p:sldMasterIdLst>
   <p:notesMasterIdLst>
-    <p:notesMasterId r:id="rId14"/>
+    <p:notesMasterId r:id="rId17"/>
   </p:notesMasterIdLst>
   <p:sldIdLst>
     <p:sldId id="256" r:id="rId5"/>
@@ -15,8 +15,11 @@
     <p:sldId id="260" r:id="rId9"/>
     <p:sldId id="261" r:id="rId10"/>
     <p:sldId id="262" r:id="rId11"/>
-    <p:sldId id="263" r:id="rId12"/>
-    <p:sldId id="264" r:id="rId13"/>
+    <p:sldId id="265" r:id="rId12"/>
+    <p:sldId id="266" r:id="rId13"/>
+    <p:sldId id="267" r:id="rId14"/>
+    <p:sldId id="263" r:id="rId15"/>
+    <p:sldId id="264" r:id="rId16"/>
   </p:sldIdLst>
   <p:sldSz cx="12192000" cy="6858000"/>
   <p:notesSz cx="6858000" cy="9144000"/>
@@ -5715,7 +5718,7 @@
           <a:p>
             <a:fld id="{10CA3EEA-B1CE-5145-A851-0772B3A71A61}" type="datetimeFigureOut">
               <a:rPr lang="da-DK" smtClean="0"/>
-              <a:t>13.05.2020</a:t>
+              <a:t>14.05.2020</a:t>
             </a:fld>
             <a:endParaRPr lang="da-DK"/>
           </a:p>
@@ -6659,7 +6662,7 @@
           <a:p>
             <a:fld id="{71AB7C36-32F7-4C45-A80A-AE960A1EECCB}" type="slidenum">
               <a:rPr lang="da-DK" smtClean="0"/>
-              <a:t>8</a:t>
+              <a:t>11</a:t>
             </a:fld>
             <a:endParaRPr lang="da-DK"/>
           </a:p>
@@ -6746,7 +6749,7 @@
           <a:p>
             <a:fld id="{71AB7C36-32F7-4C45-A80A-AE960A1EECCB}" type="slidenum">
               <a:rPr lang="da-DK" smtClean="0"/>
-              <a:t>9</a:t>
+              <a:t>12</a:t>
             </a:fld>
             <a:endParaRPr lang="da-DK"/>
           </a:p>
@@ -9110,7 +9113,7 @@
           <a:p>
             <a:fld id="{3C04E684-10F4-4CC3-A0B9-F03AA7BE37CF}" type="datetimeFigureOut">
               <a:rPr lang="en-US" smtClean="0"/>
-              <a:t>5/13/20</a:t>
+              <a:t>5/14/20</a:t>
             </a:fld>
             <a:endParaRPr lang="en-US"/>
           </a:p>
@@ -11599,7 +11602,7 @@
           <a:p>
             <a:fld id="{3C04E684-10F4-4CC3-A0B9-F03AA7BE37CF}" type="datetimeFigureOut">
               <a:rPr lang="en-US" smtClean="0"/>
-              <a:t>5/13/20</a:t>
+              <a:t>5/14/20</a:t>
             </a:fld>
             <a:endParaRPr lang="en-US"/>
           </a:p>
@@ -11797,7 +11800,7 @@
           <a:p>
             <a:fld id="{3C04E684-10F4-4CC3-A0B9-F03AA7BE37CF}" type="datetimeFigureOut">
               <a:rPr lang="en-US" smtClean="0"/>
-              <a:t>5/13/20</a:t>
+              <a:t>5/14/20</a:t>
             </a:fld>
             <a:endParaRPr lang="en-US"/>
           </a:p>
@@ -12005,7 +12008,7 @@
           <a:p>
             <a:fld id="{3C04E684-10F4-4CC3-A0B9-F03AA7BE37CF}" type="datetimeFigureOut">
               <a:rPr lang="en-US" smtClean="0"/>
-              <a:t>5/13/20</a:t>
+              <a:t>5/14/20</a:t>
             </a:fld>
             <a:endParaRPr lang="en-US"/>
           </a:p>
@@ -12740,7 +12743,7 @@
           <a:p>
             <a:fld id="{3C04E684-10F4-4CC3-A0B9-F03AA7BE37CF}" type="datetimeFigureOut">
               <a:rPr lang="en-US" smtClean="0"/>
-              <a:t>5/13/20</a:t>
+              <a:t>5/14/20</a:t>
             </a:fld>
             <a:endParaRPr lang="en-US"/>
           </a:p>
@@ -13381,7 +13384,7 @@
           <a:p>
             <a:fld id="{3C04E684-10F4-4CC3-A0B9-F03AA7BE37CF}" type="datetimeFigureOut">
               <a:rPr lang="en-US" smtClean="0"/>
-              <a:t>5/13/20</a:t>
+              <a:t>5/14/20</a:t>
             </a:fld>
             <a:endParaRPr lang="en-US"/>
           </a:p>
@@ -14178,7 +14181,7 @@
           <a:p>
             <a:fld id="{3C04E684-10F4-4CC3-A0B9-F03AA7BE37CF}" type="datetimeFigureOut">
               <a:rPr lang="en-US" smtClean="0"/>
-              <a:t>5/13/20</a:t>
+              <a:t>5/14/20</a:t>
             </a:fld>
             <a:endParaRPr lang="en-US"/>
           </a:p>
@@ -15126,7 +15129,7 @@
           <a:p>
             <a:fld id="{3C04E684-10F4-4CC3-A0B9-F03AA7BE37CF}" type="datetimeFigureOut">
               <a:rPr lang="en-US" smtClean="0"/>
-              <a:t>5/13/20</a:t>
+              <a:t>5/14/20</a:t>
             </a:fld>
             <a:endParaRPr lang="en-US"/>
           </a:p>
@@ -17474,7 +17477,7 @@
           <a:p>
             <a:fld id="{3C04E684-10F4-4CC3-A0B9-F03AA7BE37CF}" type="datetimeFigureOut">
               <a:rPr lang="en-US" smtClean="0"/>
-              <a:t>5/13/20</a:t>
+              <a:t>5/14/20</a:t>
             </a:fld>
             <a:endParaRPr lang="en-US"/>
           </a:p>
@@ -17587,7 +17590,7 @@
           <a:p>
             <a:fld id="{3C04E684-10F4-4CC3-A0B9-F03AA7BE37CF}" type="datetimeFigureOut">
               <a:rPr lang="en-US" smtClean="0"/>
-              <a:t>5/13/20</a:t>
+              <a:t>5/14/20</a:t>
             </a:fld>
             <a:endParaRPr lang="en-US"/>
           </a:p>
@@ -18094,7 +18097,7 @@
           <a:p>
             <a:fld id="{3C04E684-10F4-4CC3-A0B9-F03AA7BE37CF}" type="datetimeFigureOut">
               <a:rPr lang="en-US" smtClean="0"/>
-              <a:t>5/13/20</a:t>
+              <a:t>5/14/20</a:t>
             </a:fld>
             <a:endParaRPr lang="en-US"/>
           </a:p>
@@ -19395,7 +19398,7 @@
           <a:p>
             <a:fld id="{3C04E684-10F4-4CC3-A0B9-F03AA7BE37CF}" type="datetimeFigureOut">
               <a:rPr lang="en-US" smtClean="0"/>
-              <a:t>5/13/20</a:t>
+              <a:t>5/14/20</a:t>
             </a:fld>
             <a:endParaRPr lang="en-US"/>
           </a:p>
@@ -19640,7 +19643,7 @@
           <a:p>
             <a:fld id="{3C04E684-10F4-4CC3-A0B9-F03AA7BE37CF}" type="datetimeFigureOut">
               <a:rPr lang="en-US" smtClean="0"/>
-              <a:t>5/13/20</a:t>
+              <a:t>5/14/20</a:t>
             </a:fld>
             <a:endParaRPr lang="en-US"/>
           </a:p>
@@ -20826,6 +20829,838 @@
     <p:extLst>
       <p:ext uri="{BB962C8B-B14F-4D97-AF65-F5344CB8AC3E}">
         <p14:creationId xmlns:p14="http://schemas.microsoft.com/office/powerpoint/2010/main" val="3424942676"/>
+      </p:ext>
+    </p:extLst>
+  </p:cSld>
+  <p:clrMapOvr>
+    <a:masterClrMapping/>
+  </p:clrMapOvr>
+</p:sld>
+</file>
+
+<file path=ppt/slides/slide10.xml><?xml version="1.0" encoding="utf-8"?>
+<p:sld xmlns:a="http://schemas.openxmlformats.org/drawingml/2006/main" xmlns:r="http://schemas.openxmlformats.org/officeDocument/2006/relationships" xmlns:p="http://schemas.openxmlformats.org/presentationml/2006/main">
+  <p:cSld>
+    <p:spTree>
+      <p:nvGrpSpPr>
+        <p:cNvPr id="1" name=""/>
+        <p:cNvGrpSpPr/>
+        <p:nvPr/>
+      </p:nvGrpSpPr>
+      <p:grpSpPr>
+        <a:xfrm>
+          <a:off x="0" y="0"/>
+          <a:ext cx="0" cy="0"/>
+          <a:chOff x="0" y="0"/>
+          <a:chExt cx="0" cy="0"/>
+        </a:xfrm>
+      </p:grpSpPr>
+      <p:sp>
+        <p:nvSpPr>
+          <p:cNvPr id="8" name="Rektangel 7" descr="Webdesign">
+            <a:extLst>
+              <a:ext uri="{FF2B5EF4-FFF2-40B4-BE49-F238E27FC236}">
+                <a16:creationId xmlns:a16="http://schemas.microsoft.com/office/drawing/2014/main" id="{5E75E6ED-C08E-E440-B81B-E7F470B8F03A}"/>
+              </a:ext>
+            </a:extLst>
+          </p:cNvPr>
+          <p:cNvSpPr/>
+          <p:nvPr/>
+        </p:nvSpPr>
+        <p:spPr>
+          <a:xfrm>
+            <a:off x="178197" y="365124"/>
+            <a:ext cx="1320005" cy="1320005"/>
+          </a:xfrm>
+          <a:prstGeom prst="rect">
+            <a:avLst/>
+          </a:prstGeom>
+          <a:blipFill>
+            <a:blip r:embed="rId2">
+              <a:extLst>
+                <a:ext uri="{28A0092B-C50C-407E-A947-70E740481C1C}">
+                  <a14:useLocalDpi xmlns:a14="http://schemas.microsoft.com/office/drawing/2010/main" val="0"/>
+                </a:ext>
+                <a:ext uri="{96DAC541-7B7A-43D3-8B79-37D633B846F1}">
+                  <asvg:svgBlip xmlns:asvg="http://schemas.microsoft.com/office/drawing/2016/SVG/main" r:embed="rId3"/>
+                </a:ext>
+              </a:extLst>
+            </a:blip>
+            <a:srcRect/>
+            <a:stretch>
+              <a:fillRect/>
+            </a:stretch>
+          </a:blipFill>
+          <a:ln>
+            <a:noFill/>
+          </a:ln>
+        </p:spPr>
+        <p:style>
+          <a:lnRef idx="2">
+            <a:scrgbClr r="0" g="0" b="0"/>
+          </a:lnRef>
+          <a:fillRef idx="1">
+            <a:scrgbClr r="0" g="0" b="0"/>
+          </a:fillRef>
+          <a:effectRef idx="0">
+            <a:schemeClr val="accent6">
+              <a:hueOff val="0"/>
+              <a:satOff val="0"/>
+              <a:lumOff val="0"/>
+              <a:alphaOff val="0"/>
+            </a:schemeClr>
+          </a:effectRef>
+          <a:fontRef idx="minor">
+            <a:schemeClr val="lt1"/>
+          </a:fontRef>
+        </p:style>
+      </p:sp>
+      <p:sp>
+        <p:nvSpPr>
+          <p:cNvPr id="9" name="Titel 1">
+            <a:extLst>
+              <a:ext uri="{FF2B5EF4-FFF2-40B4-BE49-F238E27FC236}">
+                <a16:creationId xmlns:a16="http://schemas.microsoft.com/office/drawing/2014/main" id="{F63CB634-511D-594E-BE2D-4EC8A4AC69BC}"/>
+              </a:ext>
+            </a:extLst>
+          </p:cNvPr>
+          <p:cNvSpPr>
+            <a:spLocks noGrp="1"/>
+          </p:cNvSpPr>
+          <p:nvPr>
+            <p:ph type="title"/>
+          </p:nvPr>
+        </p:nvSpPr>
+        <p:spPr>
+          <a:xfrm>
+            <a:off x="1608302" y="365125"/>
+            <a:ext cx="9745497" cy="1325563"/>
+          </a:xfrm>
+        </p:spPr>
+        <p:txBody>
+          <a:bodyPr/>
+          <a:lstStyle/>
+          <a:p>
+            <a:r>
+              <a:rPr lang="da-DK" b="1" i="0" dirty="0">
+                <a:latin typeface="Consolas" panose="020B0609020204030204" pitchFamily="49" charset="0"/>
+                <a:cs typeface="Consolas" panose="020B0609020204030204" pitchFamily="49" charset="0"/>
+              </a:rPr>
+              <a:t>Interfaces</a:t>
+            </a:r>
+          </a:p>
+        </p:txBody>
+      </p:sp>
+      <p:pic>
+        <p:nvPicPr>
+          <p:cNvPr id="4" name="Billede 3" descr="Et billede, der indeholder fugl&#10;&#10;Automatisk genereret beskrivelse">
+            <a:extLst>
+              <a:ext uri="{FF2B5EF4-FFF2-40B4-BE49-F238E27FC236}">
+                <a16:creationId xmlns:a16="http://schemas.microsoft.com/office/drawing/2014/main" id="{74711C78-8BEB-074F-AE5D-E561BED0B28A}"/>
+              </a:ext>
+            </a:extLst>
+          </p:cNvPr>
+          <p:cNvPicPr>
+            <a:picLocks noChangeAspect="1"/>
+          </p:cNvPicPr>
+          <p:nvPr/>
+        </p:nvPicPr>
+        <p:blipFill>
+          <a:blip r:embed="rId4">
+            <a:extLst>
+              <a:ext uri="{28A0092B-C50C-407E-A947-70E740481C1C}">
+                <a14:useLocalDpi xmlns:a14="http://schemas.microsoft.com/office/drawing/2010/main" val="0"/>
+              </a:ext>
+            </a:extLst>
+          </a:blip>
+          <a:stretch>
+            <a:fillRect/>
+          </a:stretch>
+        </p:blipFill>
+        <p:spPr>
+          <a:xfrm>
+            <a:off x="302278" y="2376553"/>
+            <a:ext cx="3721100" cy="2781300"/>
+          </a:xfrm>
+          <a:prstGeom prst="rect">
+            <a:avLst/>
+          </a:prstGeom>
+        </p:spPr>
+      </p:pic>
+      <p:pic>
+        <p:nvPicPr>
+          <p:cNvPr id="6" name="Billede 5" descr="Et billede, der indeholder skærmbillede&#10;&#10;Automatisk genereret beskrivelse">
+            <a:extLst>
+              <a:ext uri="{FF2B5EF4-FFF2-40B4-BE49-F238E27FC236}">
+                <a16:creationId xmlns:a16="http://schemas.microsoft.com/office/drawing/2014/main" id="{00DB2B93-B3C4-4142-8727-D770175194FD}"/>
+              </a:ext>
+            </a:extLst>
+          </p:cNvPr>
+          <p:cNvPicPr>
+            <a:picLocks noChangeAspect="1"/>
+          </p:cNvPicPr>
+          <p:nvPr/>
+        </p:nvPicPr>
+        <p:blipFill>
+          <a:blip r:embed="rId5">
+            <a:extLst>
+              <a:ext uri="{28A0092B-C50C-407E-A947-70E740481C1C}">
+                <a14:useLocalDpi xmlns:a14="http://schemas.microsoft.com/office/drawing/2010/main" val="0"/>
+              </a:ext>
+            </a:extLst>
+          </a:blip>
+          <a:stretch>
+            <a:fillRect/>
+          </a:stretch>
+        </p:blipFill>
+        <p:spPr>
+          <a:xfrm>
+            <a:off x="5584316" y="1745514"/>
+            <a:ext cx="6305406" cy="4043377"/>
+          </a:xfrm>
+          <a:prstGeom prst="rect">
+            <a:avLst/>
+          </a:prstGeom>
+        </p:spPr>
+      </p:pic>
+      <p:sp>
+        <p:nvSpPr>
+          <p:cNvPr id="28" name="Rektangel 27">
+            <a:extLst>
+              <a:ext uri="{FF2B5EF4-FFF2-40B4-BE49-F238E27FC236}">
+                <a16:creationId xmlns:a16="http://schemas.microsoft.com/office/drawing/2014/main" id="{7C62922B-2657-4D89-B8F9-E0C552B354E8}"/>
+              </a:ext>
+            </a:extLst>
+          </p:cNvPr>
+          <p:cNvSpPr/>
+          <p:nvPr/>
+        </p:nvSpPr>
+        <p:spPr>
+          <a:xfrm>
+            <a:off x="5880960" y="2854440"/>
+            <a:ext cx="2743200" cy="182880"/>
+          </a:xfrm>
+          <a:prstGeom prst="rect">
+            <a:avLst/>
+          </a:prstGeom>
+          <a:solidFill>
+            <a:srgbClr val="E71224">
+              <a:alpha val="5000"/>
+            </a:srgbClr>
+          </a:solidFill>
+          <a:ln w="18000">
+            <a:solidFill>
+              <a:srgbClr val="E71224"/>
+            </a:solidFill>
+          </a:ln>
+        </p:spPr>
+        <p:style>
+          <a:lnRef idx="2">
+            <a:schemeClr val="accent1">
+              <a:shade val="50000"/>
+            </a:schemeClr>
+          </a:lnRef>
+          <a:fillRef idx="1">
+            <a:schemeClr val="accent1"/>
+          </a:fillRef>
+          <a:effectRef idx="0">
+            <a:schemeClr val="accent1"/>
+          </a:effectRef>
+          <a:fontRef idx="minor">
+            <a:schemeClr val="lt1"/>
+          </a:fontRef>
+        </p:style>
+        <p:txBody>
+          <a:bodyPr wrap="none" rtlCol="0" anchor="ctr" anchorCtr="1"/>
+          <a:lstStyle/>
+          <a:p>
+            <a:endParaRPr lang="da-DK">
+              <a:solidFill>
+                <a:srgbClr val="E71224"/>
+              </a:solidFill>
+            </a:endParaRPr>
+          </a:p>
+        </p:txBody>
+      </p:sp>
+      <p:sp>
+        <p:nvSpPr>
+          <p:cNvPr id="27" name="Rektangel 26">
+            <a:extLst>
+              <a:ext uri="{FF2B5EF4-FFF2-40B4-BE49-F238E27FC236}">
+                <a16:creationId xmlns:a16="http://schemas.microsoft.com/office/drawing/2014/main" id="{A45C5E8F-7855-4C57-90B6-60E91186E30D}"/>
+              </a:ext>
+            </a:extLst>
+          </p:cNvPr>
+          <p:cNvSpPr/>
+          <p:nvPr/>
+        </p:nvSpPr>
+        <p:spPr>
+          <a:xfrm>
+            <a:off x="645479" y="2664936"/>
+            <a:ext cx="3202028" cy="365760"/>
+          </a:xfrm>
+          <a:prstGeom prst="rect">
+            <a:avLst/>
+          </a:prstGeom>
+          <a:solidFill>
+            <a:srgbClr val="E71224">
+              <a:alpha val="5000"/>
+            </a:srgbClr>
+          </a:solidFill>
+          <a:ln w="18000">
+            <a:solidFill>
+              <a:srgbClr val="E71224"/>
+            </a:solidFill>
+          </a:ln>
+        </p:spPr>
+        <p:style>
+          <a:lnRef idx="2">
+            <a:schemeClr val="accent1">
+              <a:shade val="50000"/>
+            </a:schemeClr>
+          </a:lnRef>
+          <a:fillRef idx="1">
+            <a:schemeClr val="accent1"/>
+          </a:fillRef>
+          <a:effectRef idx="0">
+            <a:schemeClr val="accent1"/>
+          </a:effectRef>
+          <a:fontRef idx="minor">
+            <a:schemeClr val="lt1"/>
+          </a:fontRef>
+        </p:style>
+        <p:txBody>
+          <a:bodyPr wrap="none" rtlCol="0" anchor="ctr" anchorCtr="1"/>
+          <a:lstStyle/>
+          <a:p>
+            <a:endParaRPr lang="fr-FR">
+              <a:solidFill>
+                <a:srgbClr val="E71224"/>
+              </a:solidFill>
+            </a:endParaRPr>
+          </a:p>
+        </p:txBody>
+      </p:sp>
+      <p:sp>
+        <p:nvSpPr>
+          <p:cNvPr id="26" name="Ligebenet trapez 25">
+            <a:extLst>
+              <a:ext uri="{FF2B5EF4-FFF2-40B4-BE49-F238E27FC236}">
+                <a16:creationId xmlns:a16="http://schemas.microsoft.com/office/drawing/2014/main" id="{F4CA2A29-1D59-4317-8DD0-17AB68A8FFCF}"/>
+              </a:ext>
+            </a:extLst>
+          </p:cNvPr>
+          <p:cNvSpPr/>
+          <p:nvPr/>
+        </p:nvSpPr>
+        <p:spPr>
+          <a:xfrm>
+            <a:off x="645479" y="3059640"/>
+            <a:ext cx="3202027" cy="365760"/>
+          </a:xfrm>
+          <a:prstGeom prst="trapezoid">
+            <a:avLst>
+              <a:gd name="adj" fmla="val 0"/>
+            </a:avLst>
+          </a:prstGeom>
+          <a:solidFill>
+            <a:srgbClr val="66CC00">
+              <a:alpha val="5000"/>
+            </a:srgbClr>
+          </a:solidFill>
+          <a:ln w="18000">
+            <a:solidFill>
+              <a:srgbClr val="66CC00"/>
+            </a:solidFill>
+          </a:ln>
+        </p:spPr>
+        <p:style>
+          <a:lnRef idx="2">
+            <a:schemeClr val="accent1">
+              <a:shade val="50000"/>
+            </a:schemeClr>
+          </a:lnRef>
+          <a:fillRef idx="1">
+            <a:schemeClr val="accent1"/>
+          </a:fillRef>
+          <a:effectRef idx="0">
+            <a:schemeClr val="accent1"/>
+          </a:effectRef>
+          <a:fontRef idx="minor">
+            <a:schemeClr val="lt1"/>
+          </a:fontRef>
+        </p:style>
+        <p:txBody>
+          <a:bodyPr wrap="none" rtlCol="0" anchor="ctr" anchorCtr="1"/>
+          <a:lstStyle/>
+          <a:p>
+            <a:endParaRPr lang="fi-FI">
+              <a:solidFill>
+                <a:srgbClr val="66CC00"/>
+              </a:solidFill>
+            </a:endParaRPr>
+          </a:p>
+        </p:txBody>
+      </p:sp>
+      <p:sp>
+        <p:nvSpPr>
+          <p:cNvPr id="24" name="Parallelogram 23">
+            <a:extLst>
+              <a:ext uri="{FF2B5EF4-FFF2-40B4-BE49-F238E27FC236}">
+                <a16:creationId xmlns:a16="http://schemas.microsoft.com/office/drawing/2014/main" id="{EAC2FAFB-E4D0-49A9-A4FE-3675ABC0149C}"/>
+              </a:ext>
+            </a:extLst>
+          </p:cNvPr>
+          <p:cNvSpPr/>
+          <p:nvPr/>
+        </p:nvSpPr>
+        <p:spPr>
+          <a:xfrm>
+            <a:off x="5885280" y="3970218"/>
+            <a:ext cx="3108960" cy="213606"/>
+          </a:xfrm>
+          <a:prstGeom prst="parallelogram">
+            <a:avLst>
+              <a:gd name="adj" fmla="val 0"/>
+            </a:avLst>
+          </a:prstGeom>
+          <a:solidFill>
+            <a:srgbClr val="66CC00">
+              <a:alpha val="5000"/>
+            </a:srgbClr>
+          </a:solidFill>
+          <a:ln w="18000">
+            <a:solidFill>
+              <a:srgbClr val="66CC00"/>
+            </a:solidFill>
+          </a:ln>
+        </p:spPr>
+        <p:style>
+          <a:lnRef idx="2">
+            <a:schemeClr val="accent1">
+              <a:shade val="50000"/>
+            </a:schemeClr>
+          </a:lnRef>
+          <a:fillRef idx="1">
+            <a:schemeClr val="accent1"/>
+          </a:fillRef>
+          <a:effectRef idx="0">
+            <a:schemeClr val="accent1"/>
+          </a:effectRef>
+          <a:fontRef idx="minor">
+            <a:schemeClr val="lt1"/>
+          </a:fontRef>
+        </p:style>
+        <p:txBody>
+          <a:bodyPr wrap="none" rtlCol="0" anchor="ctr" anchorCtr="1"/>
+          <a:lstStyle/>
+          <a:p>
+            <a:endParaRPr lang="en-US">
+              <a:solidFill>
+                <a:srgbClr val="66CC00"/>
+              </a:solidFill>
+            </a:endParaRPr>
+          </a:p>
+        </p:txBody>
+      </p:sp>
+    </p:spTree>
+    <p:extLst>
+      <p:ext uri="{BB962C8B-B14F-4D97-AF65-F5344CB8AC3E}">
+        <p14:creationId xmlns:p14="http://schemas.microsoft.com/office/powerpoint/2010/main" val="831893891"/>
+      </p:ext>
+    </p:extLst>
+  </p:cSld>
+  <p:clrMapOvr>
+    <a:masterClrMapping/>
+  </p:clrMapOvr>
+</p:sld>
+</file>
+
+<file path=ppt/slides/slide11.xml><?xml version="1.0" encoding="utf-8"?>
+<p:sld xmlns:a="http://schemas.openxmlformats.org/drawingml/2006/main" xmlns:r="http://schemas.openxmlformats.org/officeDocument/2006/relationships" xmlns:p="http://schemas.openxmlformats.org/presentationml/2006/main">
+  <p:cSld>
+    <p:spTree>
+      <p:nvGrpSpPr>
+        <p:cNvPr id="1" name=""/>
+        <p:cNvGrpSpPr/>
+        <p:nvPr/>
+      </p:nvGrpSpPr>
+      <p:grpSpPr>
+        <a:xfrm>
+          <a:off x="0" y="0"/>
+          <a:ext cx="0" cy="0"/>
+          <a:chOff x="0" y="0"/>
+          <a:chExt cx="0" cy="0"/>
+        </a:xfrm>
+      </p:grpSpPr>
+      <p:sp>
+        <p:nvSpPr>
+          <p:cNvPr id="7" name="Rektangel 6" descr="Funktioner">
+            <a:extLst>
+              <a:ext uri="{FF2B5EF4-FFF2-40B4-BE49-F238E27FC236}">
+                <a16:creationId xmlns:a16="http://schemas.microsoft.com/office/drawing/2014/main" id="{43560CAB-ED29-4644-9273-A2FA20B5A2A0}"/>
+              </a:ext>
+            </a:extLst>
+          </p:cNvPr>
+          <p:cNvSpPr/>
+          <p:nvPr/>
+        </p:nvSpPr>
+        <p:spPr>
+          <a:xfrm>
+            <a:off x="178196" y="365124"/>
+            <a:ext cx="1320005" cy="1320005"/>
+          </a:xfrm>
+          <a:prstGeom prst="rect">
+            <a:avLst/>
+          </a:prstGeom>
+          <a:blipFill>
+            <a:blip r:embed="rId3">
+              <a:extLst>
+                <a:ext uri="{96DAC541-7B7A-43D3-8B79-37D633B846F1}">
+                  <asvg:svgBlip xmlns:asvg="http://schemas.microsoft.com/office/drawing/2016/SVG/main" r:embed="rId4"/>
+                </a:ext>
+              </a:extLst>
+            </a:blip>
+            <a:srcRect/>
+            <a:stretch>
+              <a:fillRect/>
+            </a:stretch>
+          </a:blipFill>
+          <a:ln>
+            <a:noFill/>
+          </a:ln>
+        </p:spPr>
+        <p:style>
+          <a:lnRef idx="2">
+            <a:scrgbClr r="0" g="0" b="0"/>
+          </a:lnRef>
+          <a:fillRef idx="1">
+            <a:scrgbClr r="0" g="0" b="0"/>
+          </a:fillRef>
+          <a:effectRef idx="0">
+            <a:schemeClr val="accent2">
+              <a:hueOff val="0"/>
+              <a:satOff val="0"/>
+              <a:lumOff val="0"/>
+              <a:alphaOff val="0"/>
+            </a:schemeClr>
+          </a:effectRef>
+          <a:fontRef idx="minor">
+            <a:schemeClr val="lt1"/>
+          </a:fontRef>
+        </p:style>
+      </p:sp>
+      <p:sp>
+        <p:nvSpPr>
+          <p:cNvPr id="2" name="Titel 1">
+            <a:extLst>
+              <a:ext uri="{FF2B5EF4-FFF2-40B4-BE49-F238E27FC236}">
+                <a16:creationId xmlns:a16="http://schemas.microsoft.com/office/drawing/2014/main" id="{0825571A-651B-5A44-B727-7486874FBD59}"/>
+              </a:ext>
+            </a:extLst>
+          </p:cNvPr>
+          <p:cNvSpPr>
+            <a:spLocks noGrp="1"/>
+          </p:cNvSpPr>
+          <p:nvPr>
+            <p:ph type="title"/>
+          </p:nvPr>
+        </p:nvSpPr>
+        <p:spPr>
+          <a:xfrm>
+            <a:off x="1608302" y="365125"/>
+            <a:ext cx="9745497" cy="1325563"/>
+          </a:xfrm>
+        </p:spPr>
+        <p:txBody>
+          <a:bodyPr/>
+          <a:lstStyle/>
+          <a:p>
+            <a:r>
+              <a:rPr lang="da-DK" b="1" i="0">
+                <a:latin typeface="Consolas" panose="020B0609020204030204" pitchFamily="49" charset="0"/>
+                <a:cs typeface="Consolas" panose="020B0609020204030204" pitchFamily="49" charset="0"/>
+              </a:rPr>
+              <a:t>Unit testing</a:t>
+            </a:r>
+          </a:p>
+        </p:txBody>
+      </p:sp>
+      <p:pic>
+        <p:nvPicPr>
+          <p:cNvPr id="4" name="Billede 3" descr="Et billede, der indeholder strand, vand, bord&#10;&#10;Automatisk genereret beskrivelse">
+            <a:extLst>
+              <a:ext uri="{FF2B5EF4-FFF2-40B4-BE49-F238E27FC236}">
+                <a16:creationId xmlns:a16="http://schemas.microsoft.com/office/drawing/2014/main" id="{9459912C-4454-AD4A-A961-10116B43B565}"/>
+              </a:ext>
+            </a:extLst>
+          </p:cNvPr>
+          <p:cNvPicPr>
+            <a:picLocks noChangeAspect="1"/>
+          </p:cNvPicPr>
+          <p:nvPr/>
+        </p:nvPicPr>
+        <p:blipFill rotWithShape="1">
+          <a:blip r:embed="rId5">
+            <a:extLst>
+              <a:ext uri="{28A0092B-C50C-407E-A947-70E740481C1C}">
+                <a14:useLocalDpi xmlns:a14="http://schemas.microsoft.com/office/drawing/2010/main" val="0"/>
+              </a:ext>
+            </a:extLst>
+          </a:blip>
+          <a:srcRect r="65567"/>
+          <a:stretch/>
+        </p:blipFill>
+        <p:spPr>
+          <a:xfrm>
+            <a:off x="563671" y="2555025"/>
+            <a:ext cx="3419605" cy="1629939"/>
+          </a:xfrm>
+          <a:prstGeom prst="rect">
+            <a:avLst/>
+          </a:prstGeom>
+        </p:spPr>
+      </p:pic>
+      <p:pic>
+        <p:nvPicPr>
+          <p:cNvPr id="11" name="Billede 10" descr="Et billede, der indeholder skærmbillede&#10;&#10;Automatisk genereret beskrivelse">
+            <a:extLst>
+              <a:ext uri="{FF2B5EF4-FFF2-40B4-BE49-F238E27FC236}">
+                <a16:creationId xmlns:a16="http://schemas.microsoft.com/office/drawing/2014/main" id="{A0F0FBAC-3BED-EE46-B468-E9370A95CDA7}"/>
+              </a:ext>
+            </a:extLst>
+          </p:cNvPr>
+          <p:cNvPicPr>
+            <a:picLocks noChangeAspect="1"/>
+          </p:cNvPicPr>
+          <p:nvPr/>
+        </p:nvPicPr>
+        <p:blipFill>
+          <a:blip r:embed="rId6">
+            <a:extLst>
+              <a:ext uri="{28A0092B-C50C-407E-A947-70E740481C1C}">
+                <a14:useLocalDpi xmlns:a14="http://schemas.microsoft.com/office/drawing/2010/main" val="0"/>
+              </a:ext>
+            </a:extLst>
+          </a:blip>
+          <a:stretch>
+            <a:fillRect/>
+          </a:stretch>
+        </p:blipFill>
+        <p:spPr>
+          <a:xfrm>
+            <a:off x="5636711" y="365124"/>
+            <a:ext cx="5477267" cy="3354942"/>
+          </a:xfrm>
+          <a:prstGeom prst="rect">
+            <a:avLst/>
+          </a:prstGeom>
+        </p:spPr>
+      </p:pic>
+      <p:pic>
+        <p:nvPicPr>
+          <p:cNvPr id="13" name="Billede 12" descr="Et billede, der indeholder skærmbillede&#10;&#10;Automatisk genereret beskrivelse">
+            <a:extLst>
+              <a:ext uri="{FF2B5EF4-FFF2-40B4-BE49-F238E27FC236}">
+                <a16:creationId xmlns:a16="http://schemas.microsoft.com/office/drawing/2014/main" id="{2B09D738-B636-B547-A63D-FDF90D77F4AC}"/>
+              </a:ext>
+            </a:extLst>
+          </p:cNvPr>
+          <p:cNvPicPr>
+            <a:picLocks noChangeAspect="1"/>
+          </p:cNvPicPr>
+          <p:nvPr/>
+        </p:nvPicPr>
+        <p:blipFill>
+          <a:blip r:embed="rId7">
+            <a:extLst>
+              <a:ext uri="{28A0092B-C50C-407E-A947-70E740481C1C}">
+                <a14:useLocalDpi xmlns:a14="http://schemas.microsoft.com/office/drawing/2010/main" val="0"/>
+              </a:ext>
+            </a:extLst>
+          </a:blip>
+          <a:stretch>
+            <a:fillRect/>
+          </a:stretch>
+        </p:blipFill>
+        <p:spPr>
+          <a:xfrm>
+            <a:off x="5636711" y="3720066"/>
+            <a:ext cx="4926120" cy="2084487"/>
+          </a:xfrm>
+          <a:prstGeom prst="rect">
+            <a:avLst/>
+          </a:prstGeom>
+        </p:spPr>
+      </p:pic>
+    </p:spTree>
+    <p:extLst>
+      <p:ext uri="{BB962C8B-B14F-4D97-AF65-F5344CB8AC3E}">
+        <p14:creationId xmlns:p14="http://schemas.microsoft.com/office/powerpoint/2010/main" val="3033085025"/>
+      </p:ext>
+    </p:extLst>
+  </p:cSld>
+  <p:clrMapOvr>
+    <a:masterClrMapping/>
+  </p:clrMapOvr>
+</p:sld>
+</file>
+
+<file path=ppt/slides/slide12.xml><?xml version="1.0" encoding="utf-8"?>
+<p:sld xmlns:a="http://schemas.openxmlformats.org/drawingml/2006/main" xmlns:r="http://schemas.openxmlformats.org/officeDocument/2006/relationships" xmlns:p="http://schemas.openxmlformats.org/presentationml/2006/main">
+  <p:cSld>
+    <p:spTree>
+      <p:nvGrpSpPr>
+        <p:cNvPr id="1" name=""/>
+        <p:cNvGrpSpPr/>
+        <p:nvPr/>
+      </p:nvGrpSpPr>
+      <p:grpSpPr>
+        <a:xfrm>
+          <a:off x="0" y="0"/>
+          <a:ext cx="0" cy="0"/>
+          <a:chOff x="0" y="0"/>
+          <a:chExt cx="0" cy="0"/>
+        </a:xfrm>
+      </p:grpSpPr>
+      <p:sp>
+        <p:nvSpPr>
+          <p:cNvPr id="5" name="Rektangel 4" descr="Spørgsmål">
+            <a:extLst>
+              <a:ext uri="{FF2B5EF4-FFF2-40B4-BE49-F238E27FC236}">
+                <a16:creationId xmlns:a16="http://schemas.microsoft.com/office/drawing/2014/main" id="{808CD837-358B-6D44-8031-F11E5F062646}"/>
+              </a:ext>
+            </a:extLst>
+          </p:cNvPr>
+          <p:cNvSpPr/>
+          <p:nvPr/>
+        </p:nvSpPr>
+        <p:spPr>
+          <a:xfrm>
+            <a:off x="178197" y="365123"/>
+            <a:ext cx="1320006" cy="1320006"/>
+          </a:xfrm>
+          <a:prstGeom prst="rect">
+            <a:avLst/>
+          </a:prstGeom>
+          <a:blipFill>
+            <a:blip r:embed="rId3">
+              <a:extLst>
+                <a:ext uri="{96DAC541-7B7A-43D3-8B79-37D633B846F1}">
+                  <asvg:svgBlip xmlns:asvg="http://schemas.microsoft.com/office/drawing/2016/SVG/main" r:embed="rId4"/>
+                </a:ext>
+              </a:extLst>
+            </a:blip>
+            <a:srcRect/>
+            <a:stretch>
+              <a:fillRect/>
+            </a:stretch>
+          </a:blipFill>
+          <a:ln>
+            <a:noFill/>
+          </a:ln>
+        </p:spPr>
+        <p:style>
+          <a:lnRef idx="2">
+            <a:scrgbClr r="0" g="0" b="0"/>
+          </a:lnRef>
+          <a:fillRef idx="1">
+            <a:scrgbClr r="0" g="0" b="0"/>
+          </a:fillRef>
+          <a:effectRef idx="0">
+            <a:schemeClr val="accent3">
+              <a:hueOff val="0"/>
+              <a:satOff val="0"/>
+              <a:lumOff val="0"/>
+              <a:alphaOff val="0"/>
+            </a:schemeClr>
+          </a:effectRef>
+          <a:fontRef idx="minor">
+            <a:schemeClr val="lt1"/>
+          </a:fontRef>
+        </p:style>
+      </p:sp>
+      <p:sp>
+        <p:nvSpPr>
+          <p:cNvPr id="3" name="Pladsholder til indhold 2">
+            <a:extLst>
+              <a:ext uri="{FF2B5EF4-FFF2-40B4-BE49-F238E27FC236}">
+                <a16:creationId xmlns:a16="http://schemas.microsoft.com/office/drawing/2014/main" id="{BD735E0C-8798-BF45-892B-3E195C580EED}"/>
+              </a:ext>
+            </a:extLst>
+          </p:cNvPr>
+          <p:cNvSpPr>
+            <a:spLocks noGrp="1"/>
+          </p:cNvSpPr>
+          <p:nvPr>
+            <p:ph idx="1"/>
+          </p:nvPr>
+        </p:nvSpPr>
+        <p:spPr>
+          <a:xfrm>
+            <a:off x="838200" y="1059673"/>
+            <a:ext cx="10515600" cy="3060192"/>
+          </a:xfrm>
+        </p:spPr>
+        <p:txBody>
+          <a:bodyPr anchor="ctr">
+            <a:normAutofit/>
+          </a:bodyPr>
+          <a:lstStyle/>
+          <a:p>
+            <a:pPr marL="0" indent="0" algn="ctr">
+              <a:buNone/>
+            </a:pPr>
+            <a:r>
+              <a:rPr lang="da-DK" sz="4000" b="1">
+                <a:latin typeface="Consolas" panose="020B0609020204030204" pitchFamily="49" charset="0"/>
+                <a:cs typeface="Consolas" panose="020B0609020204030204" pitchFamily="49" charset="0"/>
+              </a:rPr>
+              <a:t>Spørgsmål ?</a:t>
+            </a:r>
+          </a:p>
+        </p:txBody>
+      </p:sp>
+      <p:pic>
+        <p:nvPicPr>
+          <p:cNvPr id="7" name="Billede 6">
+            <a:extLst>
+              <a:ext uri="{FF2B5EF4-FFF2-40B4-BE49-F238E27FC236}">
+                <a16:creationId xmlns:a16="http://schemas.microsoft.com/office/drawing/2014/main" id="{E6802D1D-D503-0246-A3EF-882DFDE60285}"/>
+              </a:ext>
+            </a:extLst>
+          </p:cNvPr>
+          <p:cNvPicPr>
+            <a:picLocks noChangeAspect="1"/>
+          </p:cNvPicPr>
+          <p:nvPr/>
+        </p:nvPicPr>
+        <p:blipFill>
+          <a:blip r:embed="rId5">
+            <a:extLst>
+              <a:ext uri="{28A0092B-C50C-407E-A947-70E740481C1C}">
+                <a14:useLocalDpi xmlns:a14="http://schemas.microsoft.com/office/drawing/2010/main" val="0"/>
+              </a:ext>
+            </a:extLst>
+          </a:blip>
+          <a:stretch>
+            <a:fillRect/>
+          </a:stretch>
+        </p:blipFill>
+        <p:spPr>
+          <a:xfrm>
+            <a:off x="3799840" y="2960624"/>
+            <a:ext cx="4592320" cy="2594661"/>
+          </a:xfrm>
+          <a:prstGeom prst="rect">
+            <a:avLst/>
+          </a:prstGeom>
+        </p:spPr>
+      </p:pic>
+    </p:spTree>
+    <p:extLst>
+      <p:ext uri="{BB962C8B-B14F-4D97-AF65-F5344CB8AC3E}">
+        <p14:creationId xmlns:p14="http://schemas.microsoft.com/office/powerpoint/2010/main" val="2831947930"/>
       </p:ext>
     </p:extLst>
   </p:cSld>
@@ -24434,40 +25269,6 @@
           <a:chExt cx="0" cy="0"/>
         </a:xfrm>
       </p:grpSpPr>
-      <p:pic>
-        <p:nvPicPr>
-          <p:cNvPr id="7" name="Pladsholder til indhold 6">
-            <a:extLst>
-              <a:ext uri="{FF2B5EF4-FFF2-40B4-BE49-F238E27FC236}">
-                <a16:creationId xmlns:a16="http://schemas.microsoft.com/office/drawing/2014/main" id="{AF4C0B72-08BB-8947-BD98-DDC469CF9616}"/>
-              </a:ext>
-            </a:extLst>
-          </p:cNvPr>
-          <p:cNvPicPr>
-            <a:picLocks noGrp="1" noChangeAspect="1"/>
-          </p:cNvPicPr>
-          <p:nvPr>
-            <p:ph idx="1"/>
-          </p:nvPr>
-        </p:nvPicPr>
-        <p:blipFill rotWithShape="1">
-          <a:blip r:embed="rId3">
-            <a:extLst>
-              <a:ext uri="{28A0092B-C50C-407E-A947-70E740481C1C}">
-                <a14:useLocalDpi xmlns:a14="http://schemas.microsoft.com/office/drawing/2010/main" val="0"/>
-              </a:ext>
-            </a:extLst>
-          </a:blip>
-          <a:srcRect t="1842" b="7917"/>
-          <a:stretch/>
-        </p:blipFill>
-        <p:spPr>
-          <a:xfrm>
-            <a:off x="3903758" y="0"/>
-            <a:ext cx="5362162" cy="6836124"/>
-          </a:xfrm>
-        </p:spPr>
-      </p:pic>
       <p:sp>
         <p:nvSpPr>
           <p:cNvPr id="2" name="Titel 1">
@@ -24525,10 +25326,10 @@
             <a:avLst/>
           </a:prstGeom>
           <a:blipFill>
-            <a:blip r:embed="rId4">
+            <a:blip r:embed="rId3">
               <a:extLst>
                 <a:ext uri="{96DAC541-7B7A-43D3-8B79-37D633B846F1}">
-                  <asvg:svgBlip xmlns:asvg="http://schemas.microsoft.com/office/drawing/2016/SVG/main" r:embed="rId5"/>
+                  <asvg:svgBlip xmlns:asvg="http://schemas.microsoft.com/office/drawing/2016/SVG/main" r:embed="rId4"/>
                 </a:ext>
               </a:extLst>
             </a:blip>
@@ -24561,6 +25362,76 @@
           </a:fontRef>
         </p:style>
       </p:sp>
+      <p:pic>
+        <p:nvPicPr>
+          <p:cNvPr id="4" name="Billede 3" descr="Et billede, der indeholder tekst&#10;&#10;Automatisk genereret beskrivelse">
+            <a:extLst>
+              <a:ext uri="{FF2B5EF4-FFF2-40B4-BE49-F238E27FC236}">
+                <a16:creationId xmlns:a16="http://schemas.microsoft.com/office/drawing/2014/main" id="{05EC768B-D1F2-E44F-8D1B-B23B0B901991}"/>
+              </a:ext>
+            </a:extLst>
+          </p:cNvPr>
+          <p:cNvPicPr>
+            <a:picLocks noChangeAspect="1"/>
+          </p:cNvPicPr>
+          <p:nvPr/>
+        </p:nvPicPr>
+        <p:blipFill rotWithShape="1">
+          <a:blip r:embed="rId5">
+            <a:extLst>
+              <a:ext uri="{28A0092B-C50C-407E-A947-70E740481C1C}">
+                <a14:useLocalDpi xmlns:a14="http://schemas.microsoft.com/office/drawing/2010/main" val="0"/>
+              </a:ext>
+            </a:extLst>
+          </a:blip>
+          <a:srcRect t="82448"/>
+          <a:stretch/>
+        </p:blipFill>
+        <p:spPr>
+          <a:xfrm>
+            <a:off x="5015504" y="2373971"/>
+            <a:ext cx="5710162" cy="2110057"/>
+          </a:xfrm>
+          <a:prstGeom prst="rect">
+            <a:avLst/>
+          </a:prstGeom>
+        </p:spPr>
+      </p:pic>
+      <p:pic>
+        <p:nvPicPr>
+          <p:cNvPr id="11" name="Billede 10" descr="Et billede, der indeholder tekst&#10;&#10;Automatisk genereret beskrivelse">
+            <a:extLst>
+              <a:ext uri="{FF2B5EF4-FFF2-40B4-BE49-F238E27FC236}">
+                <a16:creationId xmlns:a16="http://schemas.microsoft.com/office/drawing/2014/main" id="{13E72208-CF27-574A-BAF1-0C57763FEAFF}"/>
+              </a:ext>
+            </a:extLst>
+          </p:cNvPr>
+          <p:cNvPicPr>
+            <a:picLocks noChangeAspect="1"/>
+          </p:cNvPicPr>
+          <p:nvPr/>
+        </p:nvPicPr>
+        <p:blipFill rotWithShape="1">
+          <a:blip r:embed="rId5">
+            <a:extLst>
+              <a:ext uri="{28A0092B-C50C-407E-A947-70E740481C1C}">
+                <a14:useLocalDpi xmlns:a14="http://schemas.microsoft.com/office/drawing/2010/main" val="0"/>
+              </a:ext>
+            </a:extLst>
+          </a:blip>
+          <a:srcRect b="17625"/>
+          <a:stretch/>
+        </p:blipFill>
+        <p:spPr>
+          <a:xfrm>
+            <a:off x="5522347" y="58034"/>
+            <a:ext cx="3887635" cy="6741930"/>
+          </a:xfrm>
+          <a:prstGeom prst="rect">
+            <a:avLst/>
+          </a:prstGeom>
+        </p:spPr>
+      </p:pic>
     </p:spTree>
     <p:extLst>
       <p:ext uri="{BB962C8B-B14F-4D97-AF65-F5344CB8AC3E}">
@@ -24571,6 +25442,195 @@
   <p:clrMapOvr>
     <a:masterClrMapping/>
   </p:clrMapOvr>
+  <p:timing>
+    <p:tnLst>
+      <p:par>
+        <p:cTn id="1" dur="indefinite" restart="never" nodeType="tmRoot">
+          <p:childTnLst>
+            <p:seq concurrent="1" nextAc="seek">
+              <p:cTn id="2" dur="indefinite" nodeType="mainSeq">
+                <p:childTnLst>
+                  <p:par>
+                    <p:cTn id="3" fill="hold">
+                      <p:stCondLst>
+                        <p:cond delay="indefinite"/>
+                      </p:stCondLst>
+                      <p:childTnLst>
+                        <p:par>
+                          <p:cTn id="4" fill="hold">
+                            <p:stCondLst>
+                              <p:cond delay="0"/>
+                            </p:stCondLst>
+                            <p:childTnLst>
+                              <p:par>
+                                <p:cTn id="5" presetID="9" presetClass="entr" presetSubtype="0" fill="hold" nodeType="clickEffect">
+                                  <p:stCondLst>
+                                    <p:cond delay="0"/>
+                                  </p:stCondLst>
+                                  <p:childTnLst>
+                                    <p:set>
+                                      <p:cBhvr>
+                                        <p:cTn id="6" dur="1" fill="hold">
+                                          <p:stCondLst>
+                                            <p:cond delay="0"/>
+                                          </p:stCondLst>
+                                        </p:cTn>
+                                        <p:tgtEl>
+                                          <p:spTgt spid="4"/>
+                                        </p:tgtEl>
+                                        <p:attrNameLst>
+                                          <p:attrName>style.visibility</p:attrName>
+                                        </p:attrNameLst>
+                                      </p:cBhvr>
+                                      <p:to>
+                                        <p:strVal val="visible"/>
+                                      </p:to>
+                                    </p:set>
+                                    <p:animEffect transition="in" filter="dissolve">
+                                      <p:cBhvr>
+                                        <p:cTn id="7" dur="500"/>
+                                        <p:tgtEl>
+                                          <p:spTgt spid="4"/>
+                                        </p:tgtEl>
+                                      </p:cBhvr>
+                                    </p:animEffect>
+                                  </p:childTnLst>
+                                </p:cTn>
+                              </p:par>
+                            </p:childTnLst>
+                          </p:cTn>
+                        </p:par>
+                      </p:childTnLst>
+                    </p:cTn>
+                  </p:par>
+                  <p:par>
+                    <p:cTn id="8" fill="hold">
+                      <p:stCondLst>
+                        <p:cond delay="indefinite"/>
+                      </p:stCondLst>
+                      <p:childTnLst>
+                        <p:par>
+                          <p:cTn id="9" fill="hold">
+                            <p:stCondLst>
+                              <p:cond delay="0"/>
+                            </p:stCondLst>
+                            <p:childTnLst>
+                              <p:par>
+                                <p:cTn id="10" presetID="9" presetClass="exit" presetSubtype="0" fill="hold" nodeType="clickEffect">
+                                  <p:stCondLst>
+                                    <p:cond delay="0"/>
+                                  </p:stCondLst>
+                                  <p:childTnLst>
+                                    <p:animEffect transition="out" filter="dissolve">
+                                      <p:cBhvr>
+                                        <p:cTn id="11" dur="500"/>
+                                        <p:tgtEl>
+                                          <p:spTgt spid="4"/>
+                                        </p:tgtEl>
+                                      </p:cBhvr>
+                                    </p:animEffect>
+                                    <p:set>
+                                      <p:cBhvr>
+                                        <p:cTn id="12" dur="1" fill="hold">
+                                          <p:stCondLst>
+                                            <p:cond delay="499"/>
+                                          </p:stCondLst>
+                                        </p:cTn>
+                                        <p:tgtEl>
+                                          <p:spTgt spid="4"/>
+                                        </p:tgtEl>
+                                        <p:attrNameLst>
+                                          <p:attrName>style.visibility</p:attrName>
+                                        </p:attrNameLst>
+                                      </p:cBhvr>
+                                      <p:to>
+                                        <p:strVal val="hidden"/>
+                                      </p:to>
+                                    </p:set>
+                                  </p:childTnLst>
+                                </p:cTn>
+                              </p:par>
+                            </p:childTnLst>
+                          </p:cTn>
+                        </p:par>
+                      </p:childTnLst>
+                    </p:cTn>
+                  </p:par>
+                  <p:par>
+                    <p:cTn id="13" fill="hold">
+                      <p:stCondLst>
+                        <p:cond delay="indefinite"/>
+                      </p:stCondLst>
+                      <p:childTnLst>
+                        <p:par>
+                          <p:cTn id="14" fill="hold">
+                            <p:stCondLst>
+                              <p:cond delay="0"/>
+                            </p:stCondLst>
+                            <p:childTnLst>
+                              <p:par>
+                                <p:cTn id="15" presetID="9" presetClass="entr" presetSubtype="0" fill="hold" nodeType="clickEffect">
+                                  <p:stCondLst>
+                                    <p:cond delay="0"/>
+                                  </p:stCondLst>
+                                  <p:childTnLst>
+                                    <p:set>
+                                      <p:cBhvr>
+                                        <p:cTn id="16" dur="1" fill="hold">
+                                          <p:stCondLst>
+                                            <p:cond delay="0"/>
+                                          </p:stCondLst>
+                                        </p:cTn>
+                                        <p:tgtEl>
+                                          <p:spTgt spid="11"/>
+                                        </p:tgtEl>
+                                        <p:attrNameLst>
+                                          <p:attrName>style.visibility</p:attrName>
+                                        </p:attrNameLst>
+                                      </p:cBhvr>
+                                      <p:to>
+                                        <p:strVal val="visible"/>
+                                      </p:to>
+                                    </p:set>
+                                    <p:animEffect transition="in" filter="dissolve">
+                                      <p:cBhvr>
+                                        <p:cTn id="17" dur="500"/>
+                                        <p:tgtEl>
+                                          <p:spTgt spid="11"/>
+                                        </p:tgtEl>
+                                      </p:cBhvr>
+                                    </p:animEffect>
+                                  </p:childTnLst>
+                                </p:cTn>
+                              </p:par>
+                            </p:childTnLst>
+                          </p:cTn>
+                        </p:par>
+                      </p:childTnLst>
+                    </p:cTn>
+                  </p:par>
+                </p:childTnLst>
+              </p:cTn>
+              <p:prevCondLst>
+                <p:cond evt="onPrev" delay="0">
+                  <p:tgtEl>
+                    <p:sldTgt/>
+                  </p:tgtEl>
+                </p:cond>
+              </p:prevCondLst>
+              <p:nextCondLst>
+                <p:cond evt="onNext" delay="0">
+                  <p:tgtEl>
+                    <p:sldTgt/>
+                  </p:tgtEl>
+                </p:cond>
+              </p:nextCondLst>
+            </p:seq>
+          </p:childTnLst>
+        </p:cTn>
+      </p:par>
+    </p:tnLst>
+  </p:timing>
 </p:sld>
 </file>
 
@@ -24591,42 +25651,6 @@
           <a:chExt cx="0" cy="0"/>
         </a:xfrm>
       </p:grpSpPr>
-      <p:pic>
-        <p:nvPicPr>
-          <p:cNvPr id="9" name="Billede 8" descr="Et billede, der indeholder tekst, kort&#10;&#10;Automatisk genereret beskrivelse">
-            <a:extLst>
-              <a:ext uri="{FF2B5EF4-FFF2-40B4-BE49-F238E27FC236}">
-                <a16:creationId xmlns:a16="http://schemas.microsoft.com/office/drawing/2014/main" id="{D0E82FC3-B4CF-6248-9BAD-1757CBD3310E}"/>
-              </a:ext>
-            </a:extLst>
-          </p:cNvPr>
-          <p:cNvPicPr>
-            <a:picLocks noChangeAspect="1"/>
-          </p:cNvPicPr>
-          <p:nvPr/>
-        </p:nvPicPr>
-        <p:blipFill>
-          <a:blip r:embed="rId3">
-            <a:extLst>
-              <a:ext uri="{28A0092B-C50C-407E-A947-70E740481C1C}">
-                <a14:useLocalDpi xmlns:a14="http://schemas.microsoft.com/office/drawing/2010/main" val="0"/>
-              </a:ext>
-            </a:extLst>
-          </a:blip>
-          <a:stretch>
-            <a:fillRect/>
-          </a:stretch>
-        </p:blipFill>
-        <p:spPr>
-          <a:xfrm>
-            <a:off x="4498803" y="0"/>
-            <a:ext cx="7651527" cy="6858000"/>
-          </a:xfrm>
-          <a:prstGeom prst="rect">
-            <a:avLst/>
-          </a:prstGeom>
-        </p:spPr>
-      </p:pic>
       <p:sp>
         <p:nvSpPr>
           <p:cNvPr id="6" name="Rektangel 5" descr="Forgreningsdiagram">
@@ -24648,13 +25672,13 @@
             <a:avLst/>
           </a:prstGeom>
           <a:blipFill>
-            <a:blip r:embed="rId4">
+            <a:blip r:embed="rId3">
               <a:extLst>
                 <a:ext uri="{28A0092B-C50C-407E-A947-70E740481C1C}">
                   <a14:useLocalDpi xmlns:a14="http://schemas.microsoft.com/office/drawing/2010/main" val="0"/>
                 </a:ext>
                 <a:ext uri="{96DAC541-7B7A-43D3-8B79-37D633B846F1}">
-                  <asvg:svgBlip xmlns:asvg="http://schemas.microsoft.com/office/drawing/2016/SVG/main" r:embed="rId5"/>
+                  <asvg:svgBlip xmlns:asvg="http://schemas.microsoft.com/office/drawing/2016/SVG/main" r:embed="rId4"/>
                 </a:ext>
               </a:extLst>
             </a:blip>
@@ -24714,11 +25738,11 @@
           <a:lstStyle/>
           <a:p>
             <a:r>
-              <a:rPr lang="da-DK" b="1" i="0">
+              <a:rPr lang="da-DK" b="1" i="0" dirty="0">
                 <a:latin typeface="Consolas" panose="020B0609020204030204" pitchFamily="49" charset="0"/>
                 <a:cs typeface="Consolas" panose="020B0609020204030204" pitchFamily="49" charset="0"/>
               </a:rPr>
-              <a:t>Klassediagrammer</a:t>
+              <a:t>Klassediagram</a:t>
             </a:r>
           </a:p>
         </p:txBody>
@@ -24753,6 +25777,42 @@
           <a:chExt cx="0" cy="0"/>
         </a:xfrm>
       </p:grpSpPr>
+      <p:pic>
+        <p:nvPicPr>
+          <p:cNvPr id="4" name="Billede 3" descr="Et billede, der indeholder skærmbillede, meter, parkeringsplads, maskine&#10;&#10;Automatisk genereret beskrivelse">
+            <a:extLst>
+              <a:ext uri="{FF2B5EF4-FFF2-40B4-BE49-F238E27FC236}">
+                <a16:creationId xmlns:a16="http://schemas.microsoft.com/office/drawing/2014/main" id="{51D552AC-29BE-8B47-8191-CA6530A57225}"/>
+              </a:ext>
+            </a:extLst>
+          </p:cNvPr>
+          <p:cNvPicPr>
+            <a:picLocks noChangeAspect="1"/>
+          </p:cNvPicPr>
+          <p:nvPr/>
+        </p:nvPicPr>
+        <p:blipFill>
+          <a:blip r:embed="rId3">
+            <a:extLst>
+              <a:ext uri="{28A0092B-C50C-407E-A947-70E740481C1C}">
+                <a14:useLocalDpi xmlns:a14="http://schemas.microsoft.com/office/drawing/2010/main" val="0"/>
+              </a:ext>
+            </a:extLst>
+          </a:blip>
+          <a:stretch>
+            <a:fillRect/>
+          </a:stretch>
+        </p:blipFill>
+        <p:spPr>
+          <a:xfrm>
+            <a:off x="2630608" y="0"/>
+            <a:ext cx="8408855" cy="6858000"/>
+          </a:xfrm>
+          <a:prstGeom prst="rect">
+            <a:avLst/>
+          </a:prstGeom>
+        </p:spPr>
+      </p:pic>
       <p:sp>
         <p:nvSpPr>
           <p:cNvPr id="9" name="Rektangel 8" descr="Cloud Computing">
@@ -24774,10 +25834,10 @@
             <a:avLst/>
           </a:prstGeom>
           <a:blipFill>
-            <a:blip r:embed="rId3">
+            <a:blip r:embed="rId4">
               <a:extLst>
                 <a:ext uri="{96DAC541-7B7A-43D3-8B79-37D633B846F1}">
-                  <asvg:svgBlip xmlns:asvg="http://schemas.microsoft.com/office/drawing/2016/SVG/main" r:embed="rId4"/>
+                  <asvg:svgBlip xmlns:asvg="http://schemas.microsoft.com/office/drawing/2016/SVG/main" r:embed="rId5"/>
                 </a:ext>
               </a:extLst>
             </a:blip>
@@ -24846,40 +25906,6 @@
           </a:p>
         </p:txBody>
       </p:sp>
-      <p:pic>
-        <p:nvPicPr>
-          <p:cNvPr id="8" name="Pladsholder til indhold 7">
-            <a:extLst>
-              <a:ext uri="{FF2B5EF4-FFF2-40B4-BE49-F238E27FC236}">
-                <a16:creationId xmlns:a16="http://schemas.microsoft.com/office/drawing/2014/main" id="{2B3AEA0C-5D9A-584B-8DA8-ED14C00254A8}"/>
-              </a:ext>
-            </a:extLst>
-          </p:cNvPr>
-          <p:cNvPicPr>
-            <a:picLocks noGrp="1" noChangeAspect="1"/>
-          </p:cNvPicPr>
-          <p:nvPr>
-            <p:ph idx="1"/>
-          </p:nvPr>
-        </p:nvPicPr>
-        <p:blipFill rotWithShape="1">
-          <a:blip r:embed="rId5">
-            <a:extLst>
-              <a:ext uri="{28A0092B-C50C-407E-A947-70E740481C1C}">
-                <a14:useLocalDpi xmlns:a14="http://schemas.microsoft.com/office/drawing/2010/main" val="0"/>
-              </a:ext>
-            </a:extLst>
-          </a:blip>
-          <a:srcRect b="68637"/>
-          <a:stretch/>
-        </p:blipFill>
-        <p:spPr>
-          <a:xfrm>
-            <a:off x="1249729" y="1490057"/>
-            <a:ext cx="10652543" cy="4727863"/>
-          </a:xfrm>
-        </p:spPr>
-      </p:pic>
     </p:spTree>
     <p:extLst>
       <p:ext uri="{BB962C8B-B14F-4D97-AF65-F5344CB8AC3E}">
@@ -25005,10 +26031,10 @@
       </p:sp>
       <p:pic>
         <p:nvPicPr>
-          <p:cNvPr id="9" name="Billede 8">
+          <p:cNvPr id="5" name="Billede 4">
             <a:extLst>
               <a:ext uri="{FF2B5EF4-FFF2-40B4-BE49-F238E27FC236}">
-                <a16:creationId xmlns:a16="http://schemas.microsoft.com/office/drawing/2014/main" id="{9FEADEF5-BD18-B14C-8D0E-93FDF22E564B}"/>
+                <a16:creationId xmlns:a16="http://schemas.microsoft.com/office/drawing/2014/main" id="{BD547B8A-FD6E-C44E-90F0-BB1855FC1061}"/>
               </a:ext>
             </a:extLst>
           </p:cNvPr>
@@ -25018,64 +26044,21 @@
           <p:nvPr/>
         </p:nvPicPr>
         <p:blipFill>
-          <a:blip r:embed="rId5">
-            <a:extLst>
-              <a:ext uri="{28A0092B-C50C-407E-A947-70E740481C1C}">
-                <a14:useLocalDpi xmlns:a14="http://schemas.microsoft.com/office/drawing/2010/main" val="0"/>
-              </a:ext>
-            </a:extLst>
-          </a:blip>
-          <a:srcRect/>
-          <a:stretch/>
+          <a:blip r:embed="rId5"/>
+          <a:stretch>
+            <a:fillRect/>
+          </a:stretch>
         </p:blipFill>
         <p:spPr>
           <a:xfrm>
-            <a:off x="4474181" y="1794241"/>
-            <a:ext cx="3243638" cy="3269518"/>
+            <a:off x="3585358" y="2337084"/>
+            <a:ext cx="5021284" cy="2830791"/>
           </a:xfrm>
           <a:prstGeom prst="rect">
             <a:avLst/>
           </a:prstGeom>
         </p:spPr>
       </p:pic>
-      <p:sp>
-        <p:nvSpPr>
-          <p:cNvPr id="10" name="Tekstfelt 9">
-            <a:extLst>
-              <a:ext uri="{FF2B5EF4-FFF2-40B4-BE49-F238E27FC236}">
-                <a16:creationId xmlns:a16="http://schemas.microsoft.com/office/drawing/2014/main" id="{D9EF9164-53FA-2F43-AB54-0A06B1FAFD74}"/>
-              </a:ext>
-            </a:extLst>
-          </p:cNvPr>
-          <p:cNvSpPr txBox="1"/>
-          <p:nvPr/>
-        </p:nvSpPr>
-        <p:spPr>
-          <a:xfrm>
-            <a:off x="5370481" y="5167312"/>
-            <a:ext cx="1451038" cy="369332"/>
-          </a:xfrm>
-          <a:prstGeom prst="rect">
-            <a:avLst/>
-          </a:prstGeom>
-          <a:noFill/>
-        </p:spPr>
-        <p:txBody>
-          <a:bodyPr wrap="none" rtlCol="0">
-            <a:spAutoFit/>
-          </a:bodyPr>
-          <a:lstStyle/>
-          <a:p>
-            <a:r>
-              <a:rPr lang="da-DK" b="1">
-                <a:latin typeface="Consolas" panose="020B0609020204030204" pitchFamily="49" charset="0"/>
-                <a:cs typeface="Consolas" panose="020B0609020204030204" pitchFamily="49" charset="0"/>
-              </a:rPr>
-              <a:t>Just-Pizza</a:t>
-            </a:r>
-          </a:p>
-        </p:txBody>
-      </p:sp>
     </p:spTree>
     <p:extLst>
       <p:ext uri="{BB962C8B-B14F-4D97-AF65-F5344CB8AC3E}">
@@ -25106,41 +26089,6 @@
           <a:chExt cx="0" cy="0"/>
         </a:xfrm>
       </p:grpSpPr>
-      <p:pic>
-        <p:nvPicPr>
-          <p:cNvPr id="7" name="Pladsholder til indhold 6" descr="Et billede, der indeholder skærmbillede&#10;&#10;Automatisk genereret beskrivelse">
-            <a:extLst>
-              <a:ext uri="{FF2B5EF4-FFF2-40B4-BE49-F238E27FC236}">
-                <a16:creationId xmlns:a16="http://schemas.microsoft.com/office/drawing/2014/main" id="{2870D7D3-0BD8-0F42-819B-E16406BCE743}"/>
-              </a:ext>
-            </a:extLst>
-          </p:cNvPr>
-          <p:cNvPicPr>
-            <a:picLocks noGrp="1" noChangeAspect="1"/>
-          </p:cNvPicPr>
-          <p:nvPr>
-            <p:ph idx="1"/>
-          </p:nvPr>
-        </p:nvPicPr>
-        <p:blipFill>
-          <a:blip r:embed="rId3">
-            <a:extLst>
-              <a:ext uri="{28A0092B-C50C-407E-A947-70E740481C1C}">
-                <a14:useLocalDpi xmlns:a14="http://schemas.microsoft.com/office/drawing/2010/main" val="0"/>
-              </a:ext>
-            </a:extLst>
-          </a:blip>
-          <a:stretch>
-            <a:fillRect/>
-          </a:stretch>
-        </p:blipFill>
-        <p:spPr>
-          <a:xfrm>
-            <a:off x="4188336" y="495141"/>
-            <a:ext cx="6835348" cy="5997734"/>
-          </a:xfrm>
-        </p:spPr>
-      </p:pic>
       <p:sp>
         <p:nvSpPr>
           <p:cNvPr id="5" name="Rektangel 4" descr="Webdesign">
@@ -25162,13 +26110,13 @@
             <a:avLst/>
           </a:prstGeom>
           <a:blipFill>
-            <a:blip r:embed="rId4">
+            <a:blip r:embed="rId3">
               <a:extLst>
                 <a:ext uri="{28A0092B-C50C-407E-A947-70E740481C1C}">
                   <a14:useLocalDpi xmlns:a14="http://schemas.microsoft.com/office/drawing/2010/main" val="0"/>
                 </a:ext>
                 <a:ext uri="{96DAC541-7B7A-43D3-8B79-37D633B846F1}">
-                  <asvg:svgBlip xmlns:asvg="http://schemas.microsoft.com/office/drawing/2016/SVG/main" r:embed="rId5"/>
+                  <asvg:svgBlip xmlns:asvg="http://schemas.microsoft.com/office/drawing/2016/SVG/main" r:embed="rId4"/>
                 </a:ext>
               </a:extLst>
             </a:blip>
@@ -25228,11 +26176,63 @@
           <a:lstStyle/>
           <a:p>
             <a:r>
-              <a:rPr lang="da-DK" b="1" i="0">
+              <a:rPr lang="da-DK" b="1" i="0" dirty="0">
                 <a:latin typeface="Consolas" panose="020B0609020204030204" pitchFamily="49" charset="0"/>
                 <a:cs typeface="Consolas" panose="020B0609020204030204" pitchFamily="49" charset="0"/>
               </a:rPr>
               <a:t>Kode design</a:t>
+            </a:r>
+          </a:p>
+        </p:txBody>
+      </p:sp>
+      <p:sp>
+        <p:nvSpPr>
+          <p:cNvPr id="4" name="Pladsholder til indhold 3">
+            <a:extLst>
+              <a:ext uri="{FF2B5EF4-FFF2-40B4-BE49-F238E27FC236}">
+                <a16:creationId xmlns:a16="http://schemas.microsoft.com/office/drawing/2014/main" id="{A881DC5A-D2A0-2F4D-B19A-1D3B630D49FB}"/>
+              </a:ext>
+            </a:extLst>
+          </p:cNvPr>
+          <p:cNvSpPr>
+            <a:spLocks noGrp="1"/>
+          </p:cNvSpPr>
+          <p:nvPr>
+            <p:ph idx="1"/>
+          </p:nvPr>
+        </p:nvSpPr>
+        <p:spPr/>
+        <p:txBody>
+          <a:bodyPr/>
+          <a:lstStyle/>
+          <a:p>
+            <a:pPr marL="514350" indent="-514350">
+              <a:buAutoNum type="arabicPeriod"/>
+            </a:pPr>
+            <a:r>
+              <a:rPr lang="da-DK" dirty="0"/>
+              <a:t>Eksempel – Nedarvning af klasser</a:t>
+            </a:r>
+          </a:p>
+          <a:p>
+            <a:pPr marL="514350" indent="-514350">
+              <a:buAutoNum type="arabicPeriod"/>
+            </a:pPr>
+            <a:endParaRPr lang="da-DK" dirty="0"/>
+          </a:p>
+          <a:p>
+            <a:pPr marL="0" indent="0">
+              <a:buNone/>
+            </a:pPr>
+            <a:endParaRPr lang="da-DK" dirty="0"/>
+          </a:p>
+          <a:p>
+            <a:pPr marL="0" indent="0">
+              <a:buNone/>
+            </a:pPr>
+            <a:r>
+              <a:rPr lang="da-DK" dirty="0"/>
+              <a:t>2. Eksempel – Implementering af interfaces</a:t>
             </a:r>
           </a:p>
         </p:txBody>
@@ -25267,46 +26267,12 @@
           <a:chExt cx="0" cy="0"/>
         </a:xfrm>
       </p:grpSpPr>
-      <p:pic>
-        <p:nvPicPr>
-          <p:cNvPr id="8" name="Pladsholder til indhold 7" descr="Et billede, der indeholder skærmbillede&#10;&#10;Automatisk genereret beskrivelse">
+      <p:sp>
+        <p:nvSpPr>
+          <p:cNvPr id="8" name="Rektangel 7" descr="Webdesign">
             <a:extLst>
               <a:ext uri="{FF2B5EF4-FFF2-40B4-BE49-F238E27FC236}">
-                <a16:creationId xmlns:a16="http://schemas.microsoft.com/office/drawing/2014/main" id="{115EAE2A-EB15-904D-9981-5AD86C8FE60A}"/>
-              </a:ext>
-            </a:extLst>
-          </p:cNvPr>
-          <p:cNvPicPr>
-            <a:picLocks noGrp="1" noChangeAspect="1"/>
-          </p:cNvPicPr>
-          <p:nvPr>
-            <p:ph idx="1"/>
-          </p:nvPr>
-        </p:nvPicPr>
-        <p:blipFill rotWithShape="1">
-          <a:blip r:embed="rId3">
-            <a:extLst>
-              <a:ext uri="{28A0092B-C50C-407E-A947-70E740481C1C}">
-                <a14:useLocalDpi xmlns:a14="http://schemas.microsoft.com/office/drawing/2010/main" val="0"/>
-              </a:ext>
-            </a:extLst>
-          </a:blip>
-          <a:srcRect r="43931"/>
-          <a:stretch/>
-        </p:blipFill>
-        <p:spPr>
-          <a:xfrm>
-            <a:off x="4862965" y="167640"/>
-            <a:ext cx="7246614" cy="6522719"/>
-          </a:xfrm>
-        </p:spPr>
-      </p:pic>
-      <p:sp>
-        <p:nvSpPr>
-          <p:cNvPr id="7" name="Rektangel 6" descr="Funktioner">
-            <a:extLst>
-              <a:ext uri="{FF2B5EF4-FFF2-40B4-BE49-F238E27FC236}">
-                <a16:creationId xmlns:a16="http://schemas.microsoft.com/office/drawing/2014/main" id="{43560CAB-ED29-4644-9273-A2FA20B5A2A0}"/>
+                <a16:creationId xmlns:a16="http://schemas.microsoft.com/office/drawing/2014/main" id="{5E75E6ED-C08E-E440-B81B-E7F470B8F03A}"/>
               </a:ext>
             </a:extLst>
           </p:cNvPr>
@@ -25315,17 +26281,20 @@
         </p:nvSpPr>
         <p:spPr>
           <a:xfrm>
-            <a:off x="178196" y="365124"/>
+            <a:off x="178197" y="365124"/>
             <a:ext cx="1320005" cy="1320005"/>
           </a:xfrm>
           <a:prstGeom prst="rect">
             <a:avLst/>
           </a:prstGeom>
           <a:blipFill>
-            <a:blip r:embed="rId4">
+            <a:blip r:embed="rId2">
               <a:extLst>
+                <a:ext uri="{28A0092B-C50C-407E-A947-70E740481C1C}">
+                  <a14:useLocalDpi xmlns:a14="http://schemas.microsoft.com/office/drawing/2010/main" val="0"/>
+                </a:ext>
                 <a:ext uri="{96DAC541-7B7A-43D3-8B79-37D633B846F1}">
-                  <asvg:svgBlip xmlns:asvg="http://schemas.microsoft.com/office/drawing/2016/SVG/main" r:embed="rId5"/>
+                  <asvg:svgBlip xmlns:asvg="http://schemas.microsoft.com/office/drawing/2016/SVG/main" r:embed="rId3"/>
                 </a:ext>
               </a:extLst>
             </a:blip>
@@ -25346,7 +26315,7 @@
             <a:scrgbClr r="0" g="0" b="0"/>
           </a:fillRef>
           <a:effectRef idx="0">
-            <a:schemeClr val="accent2">
+            <a:schemeClr val="accent6">
               <a:hueOff val="0"/>
               <a:satOff val="0"/>
               <a:lumOff val="0"/>
@@ -25360,10 +26329,10 @@
       </p:sp>
       <p:sp>
         <p:nvSpPr>
-          <p:cNvPr id="2" name="Titel 1">
+          <p:cNvPr id="9" name="Titel 1">
             <a:extLst>
               <a:ext uri="{FF2B5EF4-FFF2-40B4-BE49-F238E27FC236}">
-                <a16:creationId xmlns:a16="http://schemas.microsoft.com/office/drawing/2014/main" id="{0825571A-651B-5A44-B727-7486874FBD59}"/>
+                <a16:creationId xmlns:a16="http://schemas.microsoft.com/office/drawing/2014/main" id="{F63CB634-511D-594E-BE2D-4EC8A4AC69BC}"/>
               </a:ext>
             </a:extLst>
           </p:cNvPr>
@@ -25385,21 +26354,104 @@
           <a:lstStyle/>
           <a:p>
             <a:r>
-              <a:rPr lang="da-DK" b="1" i="0">
+              <a:rPr lang="da-DK" b="1" i="0" dirty="0">
                 <a:latin typeface="Consolas" panose="020B0609020204030204" pitchFamily="49" charset="0"/>
                 <a:cs typeface="Consolas" panose="020B0609020204030204" pitchFamily="49" charset="0"/>
               </a:rPr>
-              <a:t>Unit testing</a:t>
+              <a:t>Nedarvning</a:t>
             </a:r>
           </a:p>
         </p:txBody>
       </p:sp>
       <p:pic>
         <p:nvPicPr>
-          <p:cNvPr id="10" name="Billede 9" descr="Et billede, der indeholder skærmbillede&#10;&#10;Automatisk genereret beskrivelse">
+          <p:cNvPr id="11" name="Billede 10" descr="Et billede, der indeholder skærmbillede&#10;&#10;Automatisk genereret beskrivelse">
             <a:extLst>
               <a:ext uri="{FF2B5EF4-FFF2-40B4-BE49-F238E27FC236}">
-                <a16:creationId xmlns:a16="http://schemas.microsoft.com/office/drawing/2014/main" id="{25A9D246-509F-E84F-B6A5-659415DF6BFD}"/>
+                <a16:creationId xmlns:a16="http://schemas.microsoft.com/office/drawing/2014/main" id="{631C4DE2-8EB9-0240-8E92-B9F036D6123A}"/>
+              </a:ext>
+            </a:extLst>
+          </p:cNvPr>
+          <p:cNvPicPr>
+            <a:picLocks noChangeAspect="1"/>
+          </p:cNvPicPr>
+          <p:nvPr/>
+        </p:nvPicPr>
+        <p:blipFill>
+          <a:blip r:embed="rId4">
+            <a:extLst>
+              <a:ext uri="{28A0092B-C50C-407E-A947-70E740481C1C}">
+                <a14:useLocalDpi xmlns:a14="http://schemas.microsoft.com/office/drawing/2010/main" val="0"/>
+              </a:ext>
+            </a:extLst>
+          </a:blip>
+          <a:stretch>
+            <a:fillRect/>
+          </a:stretch>
+        </p:blipFill>
+        <p:spPr>
+          <a:xfrm>
+            <a:off x="178196" y="1685129"/>
+            <a:ext cx="5953891" cy="4076844"/>
+          </a:xfrm>
+          <a:prstGeom prst="rect">
+            <a:avLst/>
+          </a:prstGeom>
+        </p:spPr>
+      </p:pic>
+      <p:pic>
+        <p:nvPicPr>
+          <p:cNvPr id="13" name="Billede 12">
+            <a:extLst>
+              <a:ext uri="{FF2B5EF4-FFF2-40B4-BE49-F238E27FC236}">
+                <a16:creationId xmlns:a16="http://schemas.microsoft.com/office/drawing/2014/main" id="{B0493861-3208-B84F-8B22-1D5C2C3C528D}"/>
+              </a:ext>
+              <a:ext uri="{C183D7F6-B498-43B3-948B-1728B52AA6E4}">
+                <adec:decorative xmlns:adec="http://schemas.microsoft.com/office/drawing/2017/decorative" val="0"/>
+              </a:ext>
+            </a:extLst>
+          </p:cNvPr>
+          <p:cNvPicPr>
+            <a:picLocks noChangeAspect="1"/>
+          </p:cNvPicPr>
+          <p:nvPr/>
+        </p:nvPicPr>
+        <p:blipFill>
+          <a:blip r:embed="rId5">
+            <a:extLst>
+              <a:ext uri="{28A0092B-C50C-407E-A947-70E740481C1C}">
+                <a14:useLocalDpi xmlns:a14="http://schemas.microsoft.com/office/drawing/2010/main" val="0"/>
+              </a:ext>
+            </a:extLst>
+          </a:blip>
+          <a:stretch>
+            <a:fillRect/>
+          </a:stretch>
+        </p:blipFill>
+        <p:spPr>
+          <a:xfrm>
+            <a:off x="7562193" y="365124"/>
+            <a:ext cx="3505286" cy="1227153"/>
+          </a:xfrm>
+          <a:prstGeom prst="rect">
+            <a:avLst/>
+          </a:prstGeom>
+          <a:ln w="15875">
+            <a:solidFill>
+              <a:srgbClr val="92D050"/>
+            </a:solidFill>
+          </a:ln>
+          <a:effectLst>
+            <a:softEdge rad="0"/>
+          </a:effectLst>
+        </p:spPr>
+      </p:pic>
+      <p:pic>
+        <p:nvPicPr>
+          <p:cNvPr id="15" name="Billede 14" descr="Et billede, der indeholder skærmbillede&#10;&#10;Automatisk genereret beskrivelse">
+            <a:extLst>
+              <a:ext uri="{FF2B5EF4-FFF2-40B4-BE49-F238E27FC236}">
+                <a16:creationId xmlns:a16="http://schemas.microsoft.com/office/drawing/2014/main" id="{B0F2D254-5AFA-804F-A0A6-691008573D15}"/>
               </a:ext>
             </a:extLst>
           </p:cNvPr>
@@ -25422,24 +26474,1433 @@
         </p:blipFill>
         <p:spPr>
           <a:xfrm>
-            <a:off x="178196" y="3429000"/>
-            <a:ext cx="3699114" cy="1325563"/>
+            <a:off x="7562193" y="1685129"/>
+            <a:ext cx="3840304" cy="3084650"/>
           </a:xfrm>
           <a:prstGeom prst="rect">
             <a:avLst/>
           </a:prstGeom>
+          <a:ln w="15875">
+            <a:solidFill>
+              <a:schemeClr val="accent1"/>
+            </a:solidFill>
+          </a:ln>
         </p:spPr>
       </p:pic>
+      <p:pic>
+        <p:nvPicPr>
+          <p:cNvPr id="17" name="Billede 16" descr="Et billede, der indeholder skærmbillede&#10;&#10;Automatisk genereret beskrivelse">
+            <a:extLst>
+              <a:ext uri="{FF2B5EF4-FFF2-40B4-BE49-F238E27FC236}">
+                <a16:creationId xmlns:a16="http://schemas.microsoft.com/office/drawing/2014/main" id="{CD9D67B1-AC17-D749-9074-F5C0B08CF661}"/>
+              </a:ext>
+            </a:extLst>
+          </p:cNvPr>
+          <p:cNvPicPr>
+            <a:picLocks noChangeAspect="1"/>
+          </p:cNvPicPr>
+          <p:nvPr/>
+        </p:nvPicPr>
+        <p:blipFill rotWithShape="1">
+          <a:blip r:embed="rId7">
+            <a:extLst>
+              <a:ext uri="{28A0092B-C50C-407E-A947-70E740481C1C}">
+                <a14:useLocalDpi xmlns:a14="http://schemas.microsoft.com/office/drawing/2010/main" val="0"/>
+              </a:ext>
+            </a:extLst>
+          </a:blip>
+          <a:srcRect b="23915"/>
+          <a:stretch/>
+        </p:blipFill>
+        <p:spPr>
+          <a:xfrm>
+            <a:off x="7562193" y="4787475"/>
+            <a:ext cx="3840304" cy="2046004"/>
+          </a:xfrm>
+          <a:prstGeom prst="rect">
+            <a:avLst/>
+          </a:prstGeom>
+          <a:ln w="15875">
+            <a:solidFill>
+              <a:srgbClr val="00B0F0"/>
+            </a:solidFill>
+          </a:ln>
+        </p:spPr>
+      </p:pic>
+      <p:cxnSp>
+        <p:nvCxnSpPr>
+          <p:cNvPr id="19" name="Lige pilforbindelse 18">
+            <a:extLst>
+              <a:ext uri="{FF2B5EF4-FFF2-40B4-BE49-F238E27FC236}">
+                <a16:creationId xmlns:a16="http://schemas.microsoft.com/office/drawing/2014/main" id="{5812361B-1D04-0F4B-B727-D0A7225E7162}"/>
+              </a:ext>
+            </a:extLst>
+          </p:cNvPr>
+          <p:cNvCxnSpPr>
+            <a:stCxn id="13" idx="1"/>
+          </p:cNvCxnSpPr>
+          <p:nvPr/>
+        </p:nvCxnSpPr>
+        <p:spPr>
+          <a:xfrm flipH="1">
+            <a:off x="5323562" y="978701"/>
+            <a:ext cx="2238631" cy="1651765"/>
+          </a:xfrm>
+          <a:prstGeom prst="straightConnector1">
+            <a:avLst/>
+          </a:prstGeom>
+          <a:ln w="25400">
+            <a:solidFill>
+              <a:srgbClr val="92D050"/>
+            </a:solidFill>
+            <a:tailEnd type="triangle" w="lg" len="lg"/>
+          </a:ln>
+        </p:spPr>
+        <p:style>
+          <a:lnRef idx="1">
+            <a:schemeClr val="accent1"/>
+          </a:lnRef>
+          <a:fillRef idx="0">
+            <a:schemeClr val="accent1"/>
+          </a:fillRef>
+          <a:effectRef idx="0">
+            <a:schemeClr val="accent1"/>
+          </a:effectRef>
+          <a:fontRef idx="minor">
+            <a:schemeClr val="tx1"/>
+          </a:fontRef>
+        </p:style>
+      </p:cxnSp>
+      <p:cxnSp>
+        <p:nvCxnSpPr>
+          <p:cNvPr id="20" name="Lige pilforbindelse 19">
+            <a:extLst>
+              <a:ext uri="{FF2B5EF4-FFF2-40B4-BE49-F238E27FC236}">
+                <a16:creationId xmlns:a16="http://schemas.microsoft.com/office/drawing/2014/main" id="{CA380B60-98EE-3A43-B215-D31370A41DE6}"/>
+              </a:ext>
+            </a:extLst>
+          </p:cNvPr>
+          <p:cNvCxnSpPr>
+            <a:cxnSpLocks/>
+            <a:stCxn id="15" idx="1"/>
+          </p:cNvCxnSpPr>
+          <p:nvPr/>
+        </p:nvCxnSpPr>
+        <p:spPr>
+          <a:xfrm flipH="1">
+            <a:off x="5987441" y="3227454"/>
+            <a:ext cx="1574752" cy="16588"/>
+          </a:xfrm>
+          <a:prstGeom prst="straightConnector1">
+            <a:avLst/>
+          </a:prstGeom>
+          <a:ln w="25400">
+            <a:tailEnd type="triangle" w="lg" len="lg"/>
+          </a:ln>
+        </p:spPr>
+        <p:style>
+          <a:lnRef idx="1">
+            <a:schemeClr val="accent1"/>
+          </a:lnRef>
+          <a:fillRef idx="0">
+            <a:schemeClr val="accent1"/>
+          </a:fillRef>
+          <a:effectRef idx="0">
+            <a:schemeClr val="accent1"/>
+          </a:effectRef>
+          <a:fontRef idx="minor">
+            <a:schemeClr val="tx1"/>
+          </a:fontRef>
+        </p:style>
+      </p:cxnSp>
+      <p:cxnSp>
+        <p:nvCxnSpPr>
+          <p:cNvPr id="23" name="Lige pilforbindelse 22">
+            <a:extLst>
+              <a:ext uri="{FF2B5EF4-FFF2-40B4-BE49-F238E27FC236}">
+                <a16:creationId xmlns:a16="http://schemas.microsoft.com/office/drawing/2014/main" id="{E6DD8D6C-C0B9-3149-916C-4424289A530C}"/>
+              </a:ext>
+            </a:extLst>
+          </p:cNvPr>
+          <p:cNvCxnSpPr>
+            <a:cxnSpLocks/>
+            <a:stCxn id="17" idx="1"/>
+          </p:cNvCxnSpPr>
+          <p:nvPr/>
+        </p:nvCxnSpPr>
+        <p:spPr>
+          <a:xfrm flipH="1" flipV="1">
+            <a:off x="5500107" y="4227535"/>
+            <a:ext cx="2062086" cy="1582942"/>
+          </a:xfrm>
+          <a:prstGeom prst="straightConnector1">
+            <a:avLst/>
+          </a:prstGeom>
+          <a:ln w="25400">
+            <a:solidFill>
+              <a:schemeClr val="accent6"/>
+            </a:solidFill>
+            <a:tailEnd type="triangle" w="lg" len="lg"/>
+          </a:ln>
+        </p:spPr>
+        <p:style>
+          <a:lnRef idx="1">
+            <a:schemeClr val="accent1"/>
+          </a:lnRef>
+          <a:fillRef idx="0">
+            <a:schemeClr val="accent1"/>
+          </a:fillRef>
+          <a:effectRef idx="0">
+            <a:schemeClr val="accent1"/>
+          </a:effectRef>
+          <a:fontRef idx="minor">
+            <a:schemeClr val="tx1"/>
+          </a:fontRef>
+        </p:style>
+      </p:cxnSp>
+      <p:sp>
+        <p:nvSpPr>
+          <p:cNvPr id="26" name="Tekstfelt 25">
+            <a:extLst>
+              <a:ext uri="{FF2B5EF4-FFF2-40B4-BE49-F238E27FC236}">
+                <a16:creationId xmlns:a16="http://schemas.microsoft.com/office/drawing/2014/main" id="{39F64AA4-98E3-4248-B0B1-A1242E364515}"/>
+              </a:ext>
+            </a:extLst>
+          </p:cNvPr>
+          <p:cNvSpPr txBox="1"/>
+          <p:nvPr/>
+        </p:nvSpPr>
+        <p:spPr>
+          <a:xfrm rot="19339914">
+            <a:off x="5899759" y="1402915"/>
+            <a:ext cx="1189749" cy="369332"/>
+          </a:xfrm>
+          <a:prstGeom prst="rect">
+            <a:avLst/>
+          </a:prstGeom>
+          <a:noFill/>
+        </p:spPr>
+        <p:txBody>
+          <a:bodyPr wrap="none" rtlCol="0">
+            <a:spAutoFit/>
+          </a:bodyPr>
+          <a:lstStyle/>
+          <a:p>
+            <a:r>
+              <a:rPr lang="da-DK" dirty="0">
+                <a:solidFill>
+                  <a:srgbClr val="92D050"/>
+                </a:solidFill>
+              </a:rPr>
+              <a:t>Formand</a:t>
+            </a:r>
+          </a:p>
+        </p:txBody>
+      </p:sp>
+      <p:sp>
+        <p:nvSpPr>
+          <p:cNvPr id="27" name="Tekstfelt 26">
+            <a:extLst>
+              <a:ext uri="{FF2B5EF4-FFF2-40B4-BE49-F238E27FC236}">
+                <a16:creationId xmlns:a16="http://schemas.microsoft.com/office/drawing/2014/main" id="{83E9855C-919E-9C44-A9D3-5538EC7D5AFE}"/>
+              </a:ext>
+            </a:extLst>
+          </p:cNvPr>
+          <p:cNvSpPr txBox="1"/>
+          <p:nvPr/>
+        </p:nvSpPr>
+        <p:spPr>
+          <a:xfrm>
+            <a:off x="6298752" y="2874251"/>
+            <a:ext cx="1096775" cy="369332"/>
+          </a:xfrm>
+          <a:prstGeom prst="rect">
+            <a:avLst/>
+          </a:prstGeom>
+          <a:noFill/>
+        </p:spPr>
+        <p:txBody>
+          <a:bodyPr wrap="none" rtlCol="0">
+            <a:spAutoFit/>
+          </a:bodyPr>
+          <a:lstStyle/>
+          <a:p>
+            <a:r>
+              <a:rPr lang="da-DK" dirty="0">
+                <a:solidFill>
+                  <a:schemeClr val="accent1">
+                    <a:lumMod val="75000"/>
+                  </a:schemeClr>
+                </a:solidFill>
+              </a:rPr>
+              <a:t>Kasserer</a:t>
+            </a:r>
+          </a:p>
+        </p:txBody>
+      </p:sp>
+      <p:sp>
+        <p:nvSpPr>
+          <p:cNvPr id="28" name="Tekstfelt 27">
+            <a:extLst>
+              <a:ext uri="{FF2B5EF4-FFF2-40B4-BE49-F238E27FC236}">
+                <a16:creationId xmlns:a16="http://schemas.microsoft.com/office/drawing/2014/main" id="{23BBA469-752D-364A-A369-49D7EBF11604}"/>
+              </a:ext>
+            </a:extLst>
+          </p:cNvPr>
+          <p:cNvSpPr txBox="1"/>
+          <p:nvPr/>
+        </p:nvSpPr>
+        <p:spPr>
+          <a:xfrm rot="2297203">
+            <a:off x="6272414" y="4784235"/>
+            <a:ext cx="979755" cy="369332"/>
+          </a:xfrm>
+          <a:prstGeom prst="rect">
+            <a:avLst/>
+          </a:prstGeom>
+          <a:noFill/>
+        </p:spPr>
+        <p:txBody>
+          <a:bodyPr wrap="none" rtlCol="0">
+            <a:spAutoFit/>
+          </a:bodyPr>
+          <a:lstStyle/>
+          <a:p>
+            <a:r>
+              <a:rPr lang="da-DK" dirty="0">
+                <a:solidFill>
+                  <a:schemeClr val="accent6"/>
+                </a:solidFill>
+              </a:rPr>
+              <a:t>Træner</a:t>
+            </a:r>
+          </a:p>
+        </p:txBody>
+      </p:sp>
+      <p:sp>
+        <p:nvSpPr>
+          <p:cNvPr id="30" name="Krans 29">
+            <a:extLst>
+              <a:ext uri="{FF2B5EF4-FFF2-40B4-BE49-F238E27FC236}">
+                <a16:creationId xmlns:a16="http://schemas.microsoft.com/office/drawing/2014/main" id="{5BAE7C69-4A2B-424A-AAE8-CD30DBB49562}"/>
+              </a:ext>
+            </a:extLst>
+          </p:cNvPr>
+          <p:cNvSpPr/>
+          <p:nvPr/>
+        </p:nvSpPr>
+        <p:spPr>
+          <a:xfrm>
+            <a:off x="-41634" y="1457822"/>
+            <a:ext cx="999635" cy="503119"/>
+          </a:xfrm>
+          <a:prstGeom prst="donut">
+            <a:avLst>
+              <a:gd name="adj" fmla="val 9811"/>
+            </a:avLst>
+          </a:prstGeom>
+          <a:solidFill>
+            <a:srgbClr val="FF0000"/>
+          </a:solidFill>
+          <a:ln w="0"/>
+        </p:spPr>
+        <p:style>
+          <a:lnRef idx="2">
+            <a:schemeClr val="accent1">
+              <a:shade val="50000"/>
+            </a:schemeClr>
+          </a:lnRef>
+          <a:fillRef idx="1">
+            <a:schemeClr val="accent1"/>
+          </a:fillRef>
+          <a:effectRef idx="0">
+            <a:schemeClr val="accent1"/>
+          </a:effectRef>
+          <a:fontRef idx="minor">
+            <a:schemeClr val="lt1"/>
+          </a:fontRef>
+        </p:style>
+        <p:txBody>
+          <a:bodyPr rtlCol="0" anchor="ctr"/>
+          <a:lstStyle/>
+          <a:p>
+            <a:pPr algn="ctr"/>
+            <a:endParaRPr lang="da-DK">
+              <a:solidFill>
+                <a:schemeClr val="tx1"/>
+              </a:solidFill>
+            </a:endParaRPr>
+          </a:p>
+        </p:txBody>
+      </p:sp>
+      <p:sp>
+        <p:nvSpPr>
+          <p:cNvPr id="31" name="Krans 30">
+            <a:extLst>
+              <a:ext uri="{FF2B5EF4-FFF2-40B4-BE49-F238E27FC236}">
+                <a16:creationId xmlns:a16="http://schemas.microsoft.com/office/drawing/2014/main" id="{BDD939EA-F696-224F-94FD-DB5A9706075F}"/>
+              </a:ext>
+            </a:extLst>
+          </p:cNvPr>
+          <p:cNvSpPr/>
+          <p:nvPr/>
+        </p:nvSpPr>
+        <p:spPr>
+          <a:xfrm>
+            <a:off x="259334" y="1845716"/>
+            <a:ext cx="2521444" cy="503119"/>
+          </a:xfrm>
+          <a:prstGeom prst="donut">
+            <a:avLst>
+              <a:gd name="adj" fmla="val 9811"/>
+            </a:avLst>
+          </a:prstGeom>
+          <a:solidFill>
+            <a:srgbClr val="FF0000"/>
+          </a:solidFill>
+          <a:ln w="0"/>
+        </p:spPr>
+        <p:style>
+          <a:lnRef idx="2">
+            <a:schemeClr val="accent1">
+              <a:shade val="50000"/>
+            </a:schemeClr>
+          </a:lnRef>
+          <a:fillRef idx="1">
+            <a:schemeClr val="accent1"/>
+          </a:fillRef>
+          <a:effectRef idx="0">
+            <a:schemeClr val="accent1"/>
+          </a:effectRef>
+          <a:fontRef idx="minor">
+            <a:schemeClr val="lt1"/>
+          </a:fontRef>
+        </p:style>
+        <p:txBody>
+          <a:bodyPr rtlCol="0" anchor="ctr"/>
+          <a:lstStyle/>
+          <a:p>
+            <a:pPr algn="ctr"/>
+            <a:endParaRPr lang="da-DK">
+              <a:solidFill>
+                <a:schemeClr val="tx1"/>
+              </a:solidFill>
+            </a:endParaRPr>
+          </a:p>
+        </p:txBody>
+      </p:sp>
     </p:spTree>
     <p:extLst>
       <p:ext uri="{BB962C8B-B14F-4D97-AF65-F5344CB8AC3E}">
-        <p14:creationId xmlns:p14="http://schemas.microsoft.com/office/powerpoint/2010/main" val="3033085025"/>
+        <p14:creationId xmlns:p14="http://schemas.microsoft.com/office/powerpoint/2010/main" val="3591815866"/>
       </p:ext>
     </p:extLst>
   </p:cSld>
   <p:clrMapOvr>
     <a:masterClrMapping/>
   </p:clrMapOvr>
+  <p:timing>
+    <p:tnLst>
+      <p:par>
+        <p:cTn id="1" dur="indefinite" restart="never" nodeType="tmRoot">
+          <p:childTnLst>
+            <p:seq concurrent="1" nextAc="seek">
+              <p:cTn id="2" dur="indefinite" nodeType="mainSeq">
+                <p:childTnLst>
+                  <p:par>
+                    <p:cTn id="3" fill="hold">
+                      <p:stCondLst>
+                        <p:cond delay="indefinite"/>
+                      </p:stCondLst>
+                      <p:childTnLst>
+                        <p:par>
+                          <p:cTn id="4" fill="hold">
+                            <p:stCondLst>
+                              <p:cond delay="0"/>
+                            </p:stCondLst>
+                            <p:childTnLst>
+                              <p:par>
+                                <p:cTn id="5" presetID="2" presetClass="entr" presetSubtype="4" fill="hold" grpId="0" nodeType="clickEffect">
+                                  <p:stCondLst>
+                                    <p:cond delay="0"/>
+                                  </p:stCondLst>
+                                  <p:childTnLst>
+                                    <p:set>
+                                      <p:cBhvr>
+                                        <p:cTn id="6" dur="1" fill="hold">
+                                          <p:stCondLst>
+                                            <p:cond delay="0"/>
+                                          </p:stCondLst>
+                                        </p:cTn>
+                                        <p:tgtEl>
+                                          <p:spTgt spid="30"/>
+                                        </p:tgtEl>
+                                        <p:attrNameLst>
+                                          <p:attrName>style.visibility</p:attrName>
+                                        </p:attrNameLst>
+                                      </p:cBhvr>
+                                      <p:to>
+                                        <p:strVal val="visible"/>
+                                      </p:to>
+                                    </p:set>
+                                    <p:anim calcmode="lin" valueType="num">
+                                      <p:cBhvr additive="base">
+                                        <p:cTn id="7" dur="500" fill="hold"/>
+                                        <p:tgtEl>
+                                          <p:spTgt spid="30"/>
+                                        </p:tgtEl>
+                                        <p:attrNameLst>
+                                          <p:attrName>ppt_x</p:attrName>
+                                        </p:attrNameLst>
+                                      </p:cBhvr>
+                                      <p:tavLst>
+                                        <p:tav tm="0">
+                                          <p:val>
+                                            <p:strVal val="#ppt_x"/>
+                                          </p:val>
+                                        </p:tav>
+                                        <p:tav tm="100000">
+                                          <p:val>
+                                            <p:strVal val="#ppt_x"/>
+                                          </p:val>
+                                        </p:tav>
+                                      </p:tavLst>
+                                    </p:anim>
+                                    <p:anim calcmode="lin" valueType="num">
+                                      <p:cBhvr additive="base">
+                                        <p:cTn id="8" dur="500" fill="hold"/>
+                                        <p:tgtEl>
+                                          <p:spTgt spid="30"/>
+                                        </p:tgtEl>
+                                        <p:attrNameLst>
+                                          <p:attrName>ppt_y</p:attrName>
+                                        </p:attrNameLst>
+                                      </p:cBhvr>
+                                      <p:tavLst>
+                                        <p:tav tm="0">
+                                          <p:val>
+                                            <p:strVal val="1+#ppt_h/2"/>
+                                          </p:val>
+                                        </p:tav>
+                                        <p:tav tm="100000">
+                                          <p:val>
+                                            <p:strVal val="#ppt_y"/>
+                                          </p:val>
+                                        </p:tav>
+                                      </p:tavLst>
+                                    </p:anim>
+                                  </p:childTnLst>
+                                </p:cTn>
+                              </p:par>
+                            </p:childTnLst>
+                          </p:cTn>
+                        </p:par>
+                      </p:childTnLst>
+                    </p:cTn>
+                  </p:par>
+                  <p:par>
+                    <p:cTn id="9" fill="hold">
+                      <p:stCondLst>
+                        <p:cond delay="indefinite"/>
+                      </p:stCondLst>
+                      <p:childTnLst>
+                        <p:par>
+                          <p:cTn id="10" fill="hold">
+                            <p:stCondLst>
+                              <p:cond delay="0"/>
+                            </p:stCondLst>
+                            <p:childTnLst>
+                              <p:par>
+                                <p:cTn id="11" presetID="2" presetClass="entr" presetSubtype="4" fill="hold" grpId="0" nodeType="clickEffect">
+                                  <p:stCondLst>
+                                    <p:cond delay="0"/>
+                                  </p:stCondLst>
+                                  <p:childTnLst>
+                                    <p:set>
+                                      <p:cBhvr>
+                                        <p:cTn id="12" dur="1" fill="hold">
+                                          <p:stCondLst>
+                                            <p:cond delay="0"/>
+                                          </p:stCondLst>
+                                        </p:cTn>
+                                        <p:tgtEl>
+                                          <p:spTgt spid="31"/>
+                                        </p:tgtEl>
+                                        <p:attrNameLst>
+                                          <p:attrName>style.visibility</p:attrName>
+                                        </p:attrNameLst>
+                                      </p:cBhvr>
+                                      <p:to>
+                                        <p:strVal val="visible"/>
+                                      </p:to>
+                                    </p:set>
+                                    <p:anim calcmode="lin" valueType="num">
+                                      <p:cBhvr additive="base">
+                                        <p:cTn id="13" dur="500" fill="hold"/>
+                                        <p:tgtEl>
+                                          <p:spTgt spid="31"/>
+                                        </p:tgtEl>
+                                        <p:attrNameLst>
+                                          <p:attrName>ppt_x</p:attrName>
+                                        </p:attrNameLst>
+                                      </p:cBhvr>
+                                      <p:tavLst>
+                                        <p:tav tm="0">
+                                          <p:val>
+                                            <p:strVal val="#ppt_x"/>
+                                          </p:val>
+                                        </p:tav>
+                                        <p:tav tm="100000">
+                                          <p:val>
+                                            <p:strVal val="#ppt_x"/>
+                                          </p:val>
+                                        </p:tav>
+                                      </p:tavLst>
+                                    </p:anim>
+                                    <p:anim calcmode="lin" valueType="num">
+                                      <p:cBhvr additive="base">
+                                        <p:cTn id="14" dur="500" fill="hold"/>
+                                        <p:tgtEl>
+                                          <p:spTgt spid="31"/>
+                                        </p:tgtEl>
+                                        <p:attrNameLst>
+                                          <p:attrName>ppt_y</p:attrName>
+                                        </p:attrNameLst>
+                                      </p:cBhvr>
+                                      <p:tavLst>
+                                        <p:tav tm="0">
+                                          <p:val>
+                                            <p:strVal val="1+#ppt_h/2"/>
+                                          </p:val>
+                                        </p:tav>
+                                        <p:tav tm="100000">
+                                          <p:val>
+                                            <p:strVal val="#ppt_y"/>
+                                          </p:val>
+                                        </p:tav>
+                                      </p:tavLst>
+                                    </p:anim>
+                                  </p:childTnLst>
+                                </p:cTn>
+                              </p:par>
+                            </p:childTnLst>
+                          </p:cTn>
+                        </p:par>
+                      </p:childTnLst>
+                    </p:cTn>
+                  </p:par>
+                  <p:par>
+                    <p:cTn id="15" fill="hold">
+                      <p:stCondLst>
+                        <p:cond delay="indefinite"/>
+                      </p:stCondLst>
+                      <p:childTnLst>
+                        <p:par>
+                          <p:cTn id="16" fill="hold">
+                            <p:stCondLst>
+                              <p:cond delay="0"/>
+                            </p:stCondLst>
+                            <p:childTnLst>
+                              <p:par>
+                                <p:cTn id="17" presetID="42" presetClass="entr" presetSubtype="0" fill="hold" grpId="0" nodeType="clickEffect">
+                                  <p:stCondLst>
+                                    <p:cond delay="0"/>
+                                  </p:stCondLst>
+                                  <p:childTnLst>
+                                    <p:set>
+                                      <p:cBhvr>
+                                        <p:cTn id="18" dur="1" fill="hold">
+                                          <p:stCondLst>
+                                            <p:cond delay="0"/>
+                                          </p:stCondLst>
+                                        </p:cTn>
+                                        <p:tgtEl>
+                                          <p:spTgt spid="26"/>
+                                        </p:tgtEl>
+                                        <p:attrNameLst>
+                                          <p:attrName>style.visibility</p:attrName>
+                                        </p:attrNameLst>
+                                      </p:cBhvr>
+                                      <p:to>
+                                        <p:strVal val="visible"/>
+                                      </p:to>
+                                    </p:set>
+                                    <p:animEffect transition="in" filter="fade">
+                                      <p:cBhvr>
+                                        <p:cTn id="19" dur="1000"/>
+                                        <p:tgtEl>
+                                          <p:spTgt spid="26"/>
+                                        </p:tgtEl>
+                                      </p:cBhvr>
+                                    </p:animEffect>
+                                    <p:anim calcmode="lin" valueType="num">
+                                      <p:cBhvr>
+                                        <p:cTn id="20" dur="1000" fill="hold"/>
+                                        <p:tgtEl>
+                                          <p:spTgt spid="26"/>
+                                        </p:tgtEl>
+                                        <p:attrNameLst>
+                                          <p:attrName>ppt_x</p:attrName>
+                                        </p:attrNameLst>
+                                      </p:cBhvr>
+                                      <p:tavLst>
+                                        <p:tav tm="0">
+                                          <p:val>
+                                            <p:strVal val="#ppt_x"/>
+                                          </p:val>
+                                        </p:tav>
+                                        <p:tav tm="100000">
+                                          <p:val>
+                                            <p:strVal val="#ppt_x"/>
+                                          </p:val>
+                                        </p:tav>
+                                      </p:tavLst>
+                                    </p:anim>
+                                    <p:anim calcmode="lin" valueType="num">
+                                      <p:cBhvr>
+                                        <p:cTn id="21" dur="1000" fill="hold"/>
+                                        <p:tgtEl>
+                                          <p:spTgt spid="26"/>
+                                        </p:tgtEl>
+                                        <p:attrNameLst>
+                                          <p:attrName>ppt_y</p:attrName>
+                                        </p:attrNameLst>
+                                      </p:cBhvr>
+                                      <p:tavLst>
+                                        <p:tav tm="0">
+                                          <p:val>
+                                            <p:strVal val="#ppt_y+.1"/>
+                                          </p:val>
+                                        </p:tav>
+                                        <p:tav tm="100000">
+                                          <p:val>
+                                            <p:strVal val="#ppt_y"/>
+                                          </p:val>
+                                        </p:tav>
+                                      </p:tavLst>
+                                    </p:anim>
+                                  </p:childTnLst>
+                                </p:cTn>
+                              </p:par>
+                              <p:par>
+                                <p:cTn id="22" presetID="42" presetClass="entr" presetSubtype="0" fill="hold" nodeType="withEffect">
+                                  <p:stCondLst>
+                                    <p:cond delay="0"/>
+                                  </p:stCondLst>
+                                  <p:childTnLst>
+                                    <p:set>
+                                      <p:cBhvr>
+                                        <p:cTn id="23" dur="1" fill="hold">
+                                          <p:stCondLst>
+                                            <p:cond delay="0"/>
+                                          </p:stCondLst>
+                                        </p:cTn>
+                                        <p:tgtEl>
+                                          <p:spTgt spid="19"/>
+                                        </p:tgtEl>
+                                        <p:attrNameLst>
+                                          <p:attrName>style.visibility</p:attrName>
+                                        </p:attrNameLst>
+                                      </p:cBhvr>
+                                      <p:to>
+                                        <p:strVal val="visible"/>
+                                      </p:to>
+                                    </p:set>
+                                    <p:animEffect transition="in" filter="fade">
+                                      <p:cBhvr>
+                                        <p:cTn id="24" dur="1000"/>
+                                        <p:tgtEl>
+                                          <p:spTgt spid="19"/>
+                                        </p:tgtEl>
+                                      </p:cBhvr>
+                                    </p:animEffect>
+                                    <p:anim calcmode="lin" valueType="num">
+                                      <p:cBhvr>
+                                        <p:cTn id="25" dur="1000" fill="hold"/>
+                                        <p:tgtEl>
+                                          <p:spTgt spid="19"/>
+                                        </p:tgtEl>
+                                        <p:attrNameLst>
+                                          <p:attrName>ppt_x</p:attrName>
+                                        </p:attrNameLst>
+                                      </p:cBhvr>
+                                      <p:tavLst>
+                                        <p:tav tm="0">
+                                          <p:val>
+                                            <p:strVal val="#ppt_x"/>
+                                          </p:val>
+                                        </p:tav>
+                                        <p:tav tm="100000">
+                                          <p:val>
+                                            <p:strVal val="#ppt_x"/>
+                                          </p:val>
+                                        </p:tav>
+                                      </p:tavLst>
+                                    </p:anim>
+                                    <p:anim calcmode="lin" valueType="num">
+                                      <p:cBhvr>
+                                        <p:cTn id="26" dur="1000" fill="hold"/>
+                                        <p:tgtEl>
+                                          <p:spTgt spid="19"/>
+                                        </p:tgtEl>
+                                        <p:attrNameLst>
+                                          <p:attrName>ppt_y</p:attrName>
+                                        </p:attrNameLst>
+                                      </p:cBhvr>
+                                      <p:tavLst>
+                                        <p:tav tm="0">
+                                          <p:val>
+                                            <p:strVal val="#ppt_y+.1"/>
+                                          </p:val>
+                                        </p:tav>
+                                        <p:tav tm="100000">
+                                          <p:val>
+                                            <p:strVal val="#ppt_y"/>
+                                          </p:val>
+                                        </p:tav>
+                                      </p:tavLst>
+                                    </p:anim>
+                                  </p:childTnLst>
+                                </p:cTn>
+                              </p:par>
+                              <p:par>
+                                <p:cTn id="27" presetID="42" presetClass="entr" presetSubtype="0" fill="hold" nodeType="withEffect">
+                                  <p:stCondLst>
+                                    <p:cond delay="0"/>
+                                  </p:stCondLst>
+                                  <p:childTnLst>
+                                    <p:set>
+                                      <p:cBhvr>
+                                        <p:cTn id="28" dur="1" fill="hold">
+                                          <p:stCondLst>
+                                            <p:cond delay="0"/>
+                                          </p:stCondLst>
+                                        </p:cTn>
+                                        <p:tgtEl>
+                                          <p:spTgt spid="13"/>
+                                        </p:tgtEl>
+                                        <p:attrNameLst>
+                                          <p:attrName>style.visibility</p:attrName>
+                                        </p:attrNameLst>
+                                      </p:cBhvr>
+                                      <p:to>
+                                        <p:strVal val="visible"/>
+                                      </p:to>
+                                    </p:set>
+                                    <p:animEffect transition="in" filter="fade">
+                                      <p:cBhvr>
+                                        <p:cTn id="29" dur="1000"/>
+                                        <p:tgtEl>
+                                          <p:spTgt spid="13"/>
+                                        </p:tgtEl>
+                                      </p:cBhvr>
+                                    </p:animEffect>
+                                    <p:anim calcmode="lin" valueType="num">
+                                      <p:cBhvr>
+                                        <p:cTn id="30" dur="1000" fill="hold"/>
+                                        <p:tgtEl>
+                                          <p:spTgt spid="13"/>
+                                        </p:tgtEl>
+                                        <p:attrNameLst>
+                                          <p:attrName>ppt_x</p:attrName>
+                                        </p:attrNameLst>
+                                      </p:cBhvr>
+                                      <p:tavLst>
+                                        <p:tav tm="0">
+                                          <p:val>
+                                            <p:strVal val="#ppt_x"/>
+                                          </p:val>
+                                        </p:tav>
+                                        <p:tav tm="100000">
+                                          <p:val>
+                                            <p:strVal val="#ppt_x"/>
+                                          </p:val>
+                                        </p:tav>
+                                      </p:tavLst>
+                                    </p:anim>
+                                    <p:anim calcmode="lin" valueType="num">
+                                      <p:cBhvr>
+                                        <p:cTn id="31" dur="1000" fill="hold"/>
+                                        <p:tgtEl>
+                                          <p:spTgt spid="13"/>
+                                        </p:tgtEl>
+                                        <p:attrNameLst>
+                                          <p:attrName>ppt_y</p:attrName>
+                                        </p:attrNameLst>
+                                      </p:cBhvr>
+                                      <p:tavLst>
+                                        <p:tav tm="0">
+                                          <p:val>
+                                            <p:strVal val="#ppt_y+.1"/>
+                                          </p:val>
+                                        </p:tav>
+                                        <p:tav tm="100000">
+                                          <p:val>
+                                            <p:strVal val="#ppt_y"/>
+                                          </p:val>
+                                        </p:tav>
+                                      </p:tavLst>
+                                    </p:anim>
+                                  </p:childTnLst>
+                                </p:cTn>
+                              </p:par>
+                            </p:childTnLst>
+                          </p:cTn>
+                        </p:par>
+                      </p:childTnLst>
+                    </p:cTn>
+                  </p:par>
+                  <p:par>
+                    <p:cTn id="32" fill="hold">
+                      <p:stCondLst>
+                        <p:cond delay="indefinite"/>
+                      </p:stCondLst>
+                      <p:childTnLst>
+                        <p:par>
+                          <p:cTn id="33" fill="hold">
+                            <p:stCondLst>
+                              <p:cond delay="0"/>
+                            </p:stCondLst>
+                            <p:childTnLst>
+                              <p:par>
+                                <p:cTn id="34" presetID="42" presetClass="entr" presetSubtype="0" fill="hold" nodeType="clickEffect">
+                                  <p:stCondLst>
+                                    <p:cond delay="0"/>
+                                  </p:stCondLst>
+                                  <p:childTnLst>
+                                    <p:set>
+                                      <p:cBhvr>
+                                        <p:cTn id="35" dur="1" fill="hold">
+                                          <p:stCondLst>
+                                            <p:cond delay="0"/>
+                                          </p:stCondLst>
+                                        </p:cTn>
+                                        <p:tgtEl>
+                                          <p:spTgt spid="20"/>
+                                        </p:tgtEl>
+                                        <p:attrNameLst>
+                                          <p:attrName>style.visibility</p:attrName>
+                                        </p:attrNameLst>
+                                      </p:cBhvr>
+                                      <p:to>
+                                        <p:strVal val="visible"/>
+                                      </p:to>
+                                    </p:set>
+                                    <p:animEffect transition="in" filter="fade">
+                                      <p:cBhvr>
+                                        <p:cTn id="36" dur="1000"/>
+                                        <p:tgtEl>
+                                          <p:spTgt spid="20"/>
+                                        </p:tgtEl>
+                                      </p:cBhvr>
+                                    </p:animEffect>
+                                    <p:anim calcmode="lin" valueType="num">
+                                      <p:cBhvr>
+                                        <p:cTn id="37" dur="1000" fill="hold"/>
+                                        <p:tgtEl>
+                                          <p:spTgt spid="20"/>
+                                        </p:tgtEl>
+                                        <p:attrNameLst>
+                                          <p:attrName>ppt_x</p:attrName>
+                                        </p:attrNameLst>
+                                      </p:cBhvr>
+                                      <p:tavLst>
+                                        <p:tav tm="0">
+                                          <p:val>
+                                            <p:strVal val="#ppt_x"/>
+                                          </p:val>
+                                        </p:tav>
+                                        <p:tav tm="100000">
+                                          <p:val>
+                                            <p:strVal val="#ppt_x"/>
+                                          </p:val>
+                                        </p:tav>
+                                      </p:tavLst>
+                                    </p:anim>
+                                    <p:anim calcmode="lin" valueType="num">
+                                      <p:cBhvr>
+                                        <p:cTn id="38" dur="1000" fill="hold"/>
+                                        <p:tgtEl>
+                                          <p:spTgt spid="20"/>
+                                        </p:tgtEl>
+                                        <p:attrNameLst>
+                                          <p:attrName>ppt_y</p:attrName>
+                                        </p:attrNameLst>
+                                      </p:cBhvr>
+                                      <p:tavLst>
+                                        <p:tav tm="0">
+                                          <p:val>
+                                            <p:strVal val="#ppt_y+.1"/>
+                                          </p:val>
+                                        </p:tav>
+                                        <p:tav tm="100000">
+                                          <p:val>
+                                            <p:strVal val="#ppt_y"/>
+                                          </p:val>
+                                        </p:tav>
+                                      </p:tavLst>
+                                    </p:anim>
+                                  </p:childTnLst>
+                                </p:cTn>
+                              </p:par>
+                              <p:par>
+                                <p:cTn id="39" presetID="42" presetClass="entr" presetSubtype="0" fill="hold" grpId="0" nodeType="withEffect">
+                                  <p:stCondLst>
+                                    <p:cond delay="0"/>
+                                  </p:stCondLst>
+                                  <p:childTnLst>
+                                    <p:set>
+                                      <p:cBhvr>
+                                        <p:cTn id="40" dur="1" fill="hold">
+                                          <p:stCondLst>
+                                            <p:cond delay="0"/>
+                                          </p:stCondLst>
+                                        </p:cTn>
+                                        <p:tgtEl>
+                                          <p:spTgt spid="27"/>
+                                        </p:tgtEl>
+                                        <p:attrNameLst>
+                                          <p:attrName>style.visibility</p:attrName>
+                                        </p:attrNameLst>
+                                      </p:cBhvr>
+                                      <p:to>
+                                        <p:strVal val="visible"/>
+                                      </p:to>
+                                    </p:set>
+                                    <p:animEffect transition="in" filter="fade">
+                                      <p:cBhvr>
+                                        <p:cTn id="41" dur="1000"/>
+                                        <p:tgtEl>
+                                          <p:spTgt spid="27"/>
+                                        </p:tgtEl>
+                                      </p:cBhvr>
+                                    </p:animEffect>
+                                    <p:anim calcmode="lin" valueType="num">
+                                      <p:cBhvr>
+                                        <p:cTn id="42" dur="1000" fill="hold"/>
+                                        <p:tgtEl>
+                                          <p:spTgt spid="27"/>
+                                        </p:tgtEl>
+                                        <p:attrNameLst>
+                                          <p:attrName>ppt_x</p:attrName>
+                                        </p:attrNameLst>
+                                      </p:cBhvr>
+                                      <p:tavLst>
+                                        <p:tav tm="0">
+                                          <p:val>
+                                            <p:strVal val="#ppt_x"/>
+                                          </p:val>
+                                        </p:tav>
+                                        <p:tav tm="100000">
+                                          <p:val>
+                                            <p:strVal val="#ppt_x"/>
+                                          </p:val>
+                                        </p:tav>
+                                      </p:tavLst>
+                                    </p:anim>
+                                    <p:anim calcmode="lin" valueType="num">
+                                      <p:cBhvr>
+                                        <p:cTn id="43" dur="1000" fill="hold"/>
+                                        <p:tgtEl>
+                                          <p:spTgt spid="27"/>
+                                        </p:tgtEl>
+                                        <p:attrNameLst>
+                                          <p:attrName>ppt_y</p:attrName>
+                                        </p:attrNameLst>
+                                      </p:cBhvr>
+                                      <p:tavLst>
+                                        <p:tav tm="0">
+                                          <p:val>
+                                            <p:strVal val="#ppt_y+.1"/>
+                                          </p:val>
+                                        </p:tav>
+                                        <p:tav tm="100000">
+                                          <p:val>
+                                            <p:strVal val="#ppt_y"/>
+                                          </p:val>
+                                        </p:tav>
+                                      </p:tavLst>
+                                    </p:anim>
+                                  </p:childTnLst>
+                                </p:cTn>
+                              </p:par>
+                              <p:par>
+                                <p:cTn id="44" presetID="42" presetClass="entr" presetSubtype="0" fill="hold" nodeType="withEffect">
+                                  <p:stCondLst>
+                                    <p:cond delay="0"/>
+                                  </p:stCondLst>
+                                  <p:childTnLst>
+                                    <p:set>
+                                      <p:cBhvr>
+                                        <p:cTn id="45" dur="1" fill="hold">
+                                          <p:stCondLst>
+                                            <p:cond delay="0"/>
+                                          </p:stCondLst>
+                                        </p:cTn>
+                                        <p:tgtEl>
+                                          <p:spTgt spid="15"/>
+                                        </p:tgtEl>
+                                        <p:attrNameLst>
+                                          <p:attrName>style.visibility</p:attrName>
+                                        </p:attrNameLst>
+                                      </p:cBhvr>
+                                      <p:to>
+                                        <p:strVal val="visible"/>
+                                      </p:to>
+                                    </p:set>
+                                    <p:animEffect transition="in" filter="fade">
+                                      <p:cBhvr>
+                                        <p:cTn id="46" dur="1000"/>
+                                        <p:tgtEl>
+                                          <p:spTgt spid="15"/>
+                                        </p:tgtEl>
+                                      </p:cBhvr>
+                                    </p:animEffect>
+                                    <p:anim calcmode="lin" valueType="num">
+                                      <p:cBhvr>
+                                        <p:cTn id="47" dur="1000" fill="hold"/>
+                                        <p:tgtEl>
+                                          <p:spTgt spid="15"/>
+                                        </p:tgtEl>
+                                        <p:attrNameLst>
+                                          <p:attrName>ppt_x</p:attrName>
+                                        </p:attrNameLst>
+                                      </p:cBhvr>
+                                      <p:tavLst>
+                                        <p:tav tm="0">
+                                          <p:val>
+                                            <p:strVal val="#ppt_x"/>
+                                          </p:val>
+                                        </p:tav>
+                                        <p:tav tm="100000">
+                                          <p:val>
+                                            <p:strVal val="#ppt_x"/>
+                                          </p:val>
+                                        </p:tav>
+                                      </p:tavLst>
+                                    </p:anim>
+                                    <p:anim calcmode="lin" valueType="num">
+                                      <p:cBhvr>
+                                        <p:cTn id="48" dur="1000" fill="hold"/>
+                                        <p:tgtEl>
+                                          <p:spTgt spid="15"/>
+                                        </p:tgtEl>
+                                        <p:attrNameLst>
+                                          <p:attrName>ppt_y</p:attrName>
+                                        </p:attrNameLst>
+                                      </p:cBhvr>
+                                      <p:tavLst>
+                                        <p:tav tm="0">
+                                          <p:val>
+                                            <p:strVal val="#ppt_y+.1"/>
+                                          </p:val>
+                                        </p:tav>
+                                        <p:tav tm="100000">
+                                          <p:val>
+                                            <p:strVal val="#ppt_y"/>
+                                          </p:val>
+                                        </p:tav>
+                                      </p:tavLst>
+                                    </p:anim>
+                                  </p:childTnLst>
+                                </p:cTn>
+                              </p:par>
+                            </p:childTnLst>
+                          </p:cTn>
+                        </p:par>
+                      </p:childTnLst>
+                    </p:cTn>
+                  </p:par>
+                  <p:par>
+                    <p:cTn id="49" fill="hold">
+                      <p:stCondLst>
+                        <p:cond delay="indefinite"/>
+                      </p:stCondLst>
+                      <p:childTnLst>
+                        <p:par>
+                          <p:cTn id="50" fill="hold">
+                            <p:stCondLst>
+                              <p:cond delay="0"/>
+                            </p:stCondLst>
+                            <p:childTnLst>
+                              <p:par>
+                                <p:cTn id="51" presetID="42" presetClass="entr" presetSubtype="0" fill="hold" grpId="0" nodeType="clickEffect">
+                                  <p:stCondLst>
+                                    <p:cond delay="0"/>
+                                  </p:stCondLst>
+                                  <p:childTnLst>
+                                    <p:set>
+                                      <p:cBhvr>
+                                        <p:cTn id="52" dur="1" fill="hold">
+                                          <p:stCondLst>
+                                            <p:cond delay="0"/>
+                                          </p:stCondLst>
+                                        </p:cTn>
+                                        <p:tgtEl>
+                                          <p:spTgt spid="28"/>
+                                        </p:tgtEl>
+                                        <p:attrNameLst>
+                                          <p:attrName>style.visibility</p:attrName>
+                                        </p:attrNameLst>
+                                      </p:cBhvr>
+                                      <p:to>
+                                        <p:strVal val="visible"/>
+                                      </p:to>
+                                    </p:set>
+                                    <p:animEffect transition="in" filter="fade">
+                                      <p:cBhvr>
+                                        <p:cTn id="53" dur="1000"/>
+                                        <p:tgtEl>
+                                          <p:spTgt spid="28"/>
+                                        </p:tgtEl>
+                                      </p:cBhvr>
+                                    </p:animEffect>
+                                    <p:anim calcmode="lin" valueType="num">
+                                      <p:cBhvr>
+                                        <p:cTn id="54" dur="1000" fill="hold"/>
+                                        <p:tgtEl>
+                                          <p:spTgt spid="28"/>
+                                        </p:tgtEl>
+                                        <p:attrNameLst>
+                                          <p:attrName>ppt_x</p:attrName>
+                                        </p:attrNameLst>
+                                      </p:cBhvr>
+                                      <p:tavLst>
+                                        <p:tav tm="0">
+                                          <p:val>
+                                            <p:strVal val="#ppt_x"/>
+                                          </p:val>
+                                        </p:tav>
+                                        <p:tav tm="100000">
+                                          <p:val>
+                                            <p:strVal val="#ppt_x"/>
+                                          </p:val>
+                                        </p:tav>
+                                      </p:tavLst>
+                                    </p:anim>
+                                    <p:anim calcmode="lin" valueType="num">
+                                      <p:cBhvr>
+                                        <p:cTn id="55" dur="1000" fill="hold"/>
+                                        <p:tgtEl>
+                                          <p:spTgt spid="28"/>
+                                        </p:tgtEl>
+                                        <p:attrNameLst>
+                                          <p:attrName>ppt_y</p:attrName>
+                                        </p:attrNameLst>
+                                      </p:cBhvr>
+                                      <p:tavLst>
+                                        <p:tav tm="0">
+                                          <p:val>
+                                            <p:strVal val="#ppt_y+.1"/>
+                                          </p:val>
+                                        </p:tav>
+                                        <p:tav tm="100000">
+                                          <p:val>
+                                            <p:strVal val="#ppt_y"/>
+                                          </p:val>
+                                        </p:tav>
+                                      </p:tavLst>
+                                    </p:anim>
+                                  </p:childTnLst>
+                                </p:cTn>
+                              </p:par>
+                              <p:par>
+                                <p:cTn id="56" presetID="42" presetClass="entr" presetSubtype="0" fill="hold" nodeType="withEffect">
+                                  <p:stCondLst>
+                                    <p:cond delay="0"/>
+                                  </p:stCondLst>
+                                  <p:childTnLst>
+                                    <p:set>
+                                      <p:cBhvr>
+                                        <p:cTn id="57" dur="1" fill="hold">
+                                          <p:stCondLst>
+                                            <p:cond delay="0"/>
+                                          </p:stCondLst>
+                                        </p:cTn>
+                                        <p:tgtEl>
+                                          <p:spTgt spid="23"/>
+                                        </p:tgtEl>
+                                        <p:attrNameLst>
+                                          <p:attrName>style.visibility</p:attrName>
+                                        </p:attrNameLst>
+                                      </p:cBhvr>
+                                      <p:to>
+                                        <p:strVal val="visible"/>
+                                      </p:to>
+                                    </p:set>
+                                    <p:animEffect transition="in" filter="fade">
+                                      <p:cBhvr>
+                                        <p:cTn id="58" dur="1000"/>
+                                        <p:tgtEl>
+                                          <p:spTgt spid="23"/>
+                                        </p:tgtEl>
+                                      </p:cBhvr>
+                                    </p:animEffect>
+                                    <p:anim calcmode="lin" valueType="num">
+                                      <p:cBhvr>
+                                        <p:cTn id="59" dur="1000" fill="hold"/>
+                                        <p:tgtEl>
+                                          <p:spTgt spid="23"/>
+                                        </p:tgtEl>
+                                        <p:attrNameLst>
+                                          <p:attrName>ppt_x</p:attrName>
+                                        </p:attrNameLst>
+                                      </p:cBhvr>
+                                      <p:tavLst>
+                                        <p:tav tm="0">
+                                          <p:val>
+                                            <p:strVal val="#ppt_x"/>
+                                          </p:val>
+                                        </p:tav>
+                                        <p:tav tm="100000">
+                                          <p:val>
+                                            <p:strVal val="#ppt_x"/>
+                                          </p:val>
+                                        </p:tav>
+                                      </p:tavLst>
+                                    </p:anim>
+                                    <p:anim calcmode="lin" valueType="num">
+                                      <p:cBhvr>
+                                        <p:cTn id="60" dur="1000" fill="hold"/>
+                                        <p:tgtEl>
+                                          <p:spTgt spid="23"/>
+                                        </p:tgtEl>
+                                        <p:attrNameLst>
+                                          <p:attrName>ppt_y</p:attrName>
+                                        </p:attrNameLst>
+                                      </p:cBhvr>
+                                      <p:tavLst>
+                                        <p:tav tm="0">
+                                          <p:val>
+                                            <p:strVal val="#ppt_y+.1"/>
+                                          </p:val>
+                                        </p:tav>
+                                        <p:tav tm="100000">
+                                          <p:val>
+                                            <p:strVal val="#ppt_y"/>
+                                          </p:val>
+                                        </p:tav>
+                                      </p:tavLst>
+                                    </p:anim>
+                                  </p:childTnLst>
+                                </p:cTn>
+                              </p:par>
+                              <p:par>
+                                <p:cTn id="61" presetID="42" presetClass="entr" presetSubtype="0" fill="hold" nodeType="withEffect">
+                                  <p:stCondLst>
+                                    <p:cond delay="0"/>
+                                  </p:stCondLst>
+                                  <p:childTnLst>
+                                    <p:set>
+                                      <p:cBhvr>
+                                        <p:cTn id="62" dur="1" fill="hold">
+                                          <p:stCondLst>
+                                            <p:cond delay="0"/>
+                                          </p:stCondLst>
+                                        </p:cTn>
+                                        <p:tgtEl>
+                                          <p:spTgt spid="17"/>
+                                        </p:tgtEl>
+                                        <p:attrNameLst>
+                                          <p:attrName>style.visibility</p:attrName>
+                                        </p:attrNameLst>
+                                      </p:cBhvr>
+                                      <p:to>
+                                        <p:strVal val="visible"/>
+                                      </p:to>
+                                    </p:set>
+                                    <p:animEffect transition="in" filter="fade">
+                                      <p:cBhvr>
+                                        <p:cTn id="63" dur="1000"/>
+                                        <p:tgtEl>
+                                          <p:spTgt spid="17"/>
+                                        </p:tgtEl>
+                                      </p:cBhvr>
+                                    </p:animEffect>
+                                    <p:anim calcmode="lin" valueType="num">
+                                      <p:cBhvr>
+                                        <p:cTn id="64" dur="1000" fill="hold"/>
+                                        <p:tgtEl>
+                                          <p:spTgt spid="17"/>
+                                        </p:tgtEl>
+                                        <p:attrNameLst>
+                                          <p:attrName>ppt_x</p:attrName>
+                                        </p:attrNameLst>
+                                      </p:cBhvr>
+                                      <p:tavLst>
+                                        <p:tav tm="0">
+                                          <p:val>
+                                            <p:strVal val="#ppt_x"/>
+                                          </p:val>
+                                        </p:tav>
+                                        <p:tav tm="100000">
+                                          <p:val>
+                                            <p:strVal val="#ppt_x"/>
+                                          </p:val>
+                                        </p:tav>
+                                      </p:tavLst>
+                                    </p:anim>
+                                    <p:anim calcmode="lin" valueType="num">
+                                      <p:cBhvr>
+                                        <p:cTn id="65" dur="1000" fill="hold"/>
+                                        <p:tgtEl>
+                                          <p:spTgt spid="17"/>
+                                        </p:tgtEl>
+                                        <p:attrNameLst>
+                                          <p:attrName>ppt_y</p:attrName>
+                                        </p:attrNameLst>
+                                      </p:cBhvr>
+                                      <p:tavLst>
+                                        <p:tav tm="0">
+                                          <p:val>
+                                            <p:strVal val="#ppt_y+.1"/>
+                                          </p:val>
+                                        </p:tav>
+                                        <p:tav tm="100000">
+                                          <p:val>
+                                            <p:strVal val="#ppt_y"/>
+                                          </p:val>
+                                        </p:tav>
+                                      </p:tavLst>
+                                    </p:anim>
+                                  </p:childTnLst>
+                                </p:cTn>
+                              </p:par>
+                            </p:childTnLst>
+                          </p:cTn>
+                        </p:par>
+                      </p:childTnLst>
+                    </p:cTn>
+                  </p:par>
+                </p:childTnLst>
+              </p:cTn>
+              <p:prevCondLst>
+                <p:cond evt="onPrev" delay="0">
+                  <p:tgtEl>
+                    <p:sldTgt/>
+                  </p:tgtEl>
+                </p:cond>
+              </p:prevCondLst>
+              <p:nextCondLst>
+                <p:cond evt="onNext" delay="0">
+                  <p:tgtEl>
+                    <p:sldTgt/>
+                  </p:tgtEl>
+                </p:cond>
+              </p:nextCondLst>
+            </p:seq>
+          </p:childTnLst>
+        </p:cTn>
+      </p:par>
+    </p:tnLst>
+    <p:bldLst>
+      <p:bldP spid="26" grpId="0"/>
+      <p:bldP spid="27" grpId="0"/>
+      <p:bldP spid="28" grpId="0"/>
+      <p:bldP spid="30" grpId="0" animBg="1"/>
+      <p:bldP spid="31" grpId="0" animBg="1"/>
+    </p:bldLst>
+  </p:timing>
 </p:sld>
 </file>
 
@@ -25462,10 +27923,10 @@
       </p:grpSpPr>
       <p:sp>
         <p:nvSpPr>
-          <p:cNvPr id="5" name="Rektangel 4" descr="Spørgsmål">
+          <p:cNvPr id="8" name="Rektangel 7" descr="Webdesign">
             <a:extLst>
               <a:ext uri="{FF2B5EF4-FFF2-40B4-BE49-F238E27FC236}">
-                <a16:creationId xmlns:a16="http://schemas.microsoft.com/office/drawing/2014/main" id="{808CD837-358B-6D44-8031-F11E5F062646}"/>
+                <a16:creationId xmlns:a16="http://schemas.microsoft.com/office/drawing/2014/main" id="{5E75E6ED-C08E-E440-B81B-E7F470B8F03A}"/>
               </a:ext>
             </a:extLst>
           </p:cNvPr>
@@ -25474,17 +27935,20 @@
         </p:nvSpPr>
         <p:spPr>
           <a:xfrm>
-            <a:off x="178197" y="365123"/>
-            <a:ext cx="1320006" cy="1320006"/>
+            <a:off x="178197" y="365124"/>
+            <a:ext cx="1320005" cy="1320005"/>
           </a:xfrm>
           <a:prstGeom prst="rect">
             <a:avLst/>
           </a:prstGeom>
           <a:blipFill>
-            <a:blip r:embed="rId3">
+            <a:blip r:embed="rId2">
               <a:extLst>
+                <a:ext uri="{28A0092B-C50C-407E-A947-70E740481C1C}">
+                  <a14:useLocalDpi xmlns:a14="http://schemas.microsoft.com/office/drawing/2010/main" val="0"/>
+                </a:ext>
                 <a:ext uri="{96DAC541-7B7A-43D3-8B79-37D633B846F1}">
-                  <asvg:svgBlip xmlns:asvg="http://schemas.microsoft.com/office/drawing/2016/SVG/main" r:embed="rId4"/>
+                  <asvg:svgBlip xmlns:asvg="http://schemas.microsoft.com/office/drawing/2016/SVG/main" r:embed="rId3"/>
                 </a:ext>
               </a:extLst>
             </a:blip>
@@ -25505,7 +27969,7 @@
             <a:scrgbClr r="0" g="0" b="0"/>
           </a:fillRef>
           <a:effectRef idx="0">
-            <a:schemeClr val="accent3">
+            <a:schemeClr val="accent6">
               <a:hueOff val="0"/>
               <a:satOff val="0"/>
               <a:lumOff val="0"/>
@@ -25519,10 +27983,10 @@
       </p:sp>
       <p:sp>
         <p:nvSpPr>
-          <p:cNvPr id="3" name="Pladsholder til indhold 2">
+          <p:cNvPr id="9" name="Titel 1">
             <a:extLst>
               <a:ext uri="{FF2B5EF4-FFF2-40B4-BE49-F238E27FC236}">
-                <a16:creationId xmlns:a16="http://schemas.microsoft.com/office/drawing/2014/main" id="{BD735E0C-8798-BF45-892B-3E195C580EED}"/>
+                <a16:creationId xmlns:a16="http://schemas.microsoft.com/office/drawing/2014/main" id="{F63CB634-511D-594E-BE2D-4EC8A4AC69BC}"/>
               </a:ext>
             </a:extLst>
           </p:cNvPr>
@@ -25530,40 +27994,35 @@
             <a:spLocks noGrp="1"/>
           </p:cNvSpPr>
           <p:nvPr>
-            <p:ph idx="1"/>
+            <p:ph type="title"/>
           </p:nvPr>
         </p:nvSpPr>
         <p:spPr>
           <a:xfrm>
-            <a:off x="838200" y="1059673"/>
-            <a:ext cx="10515600" cy="3060192"/>
+            <a:off x="1608302" y="365125"/>
+            <a:ext cx="9745497" cy="1325563"/>
           </a:xfrm>
         </p:spPr>
         <p:txBody>
-          <a:bodyPr anchor="ctr">
-            <a:normAutofit/>
-          </a:bodyPr>
+          <a:bodyPr/>
           <a:lstStyle/>
           <a:p>
-            <a:pPr marL="0" indent="0" algn="ctr">
-              <a:buNone/>
-            </a:pPr>
             <a:r>
-              <a:rPr lang="da-DK" sz="4000" b="1">
+              <a:rPr lang="da-DK" b="1" i="0" dirty="0">
                 <a:latin typeface="Consolas" panose="020B0609020204030204" pitchFamily="49" charset="0"/>
                 <a:cs typeface="Consolas" panose="020B0609020204030204" pitchFamily="49" charset="0"/>
               </a:rPr>
-              <a:t>Spørgsmål ?</a:t>
+              <a:t>Nedarvning</a:t>
             </a:r>
           </a:p>
         </p:txBody>
       </p:sp>
       <p:pic>
         <p:nvPicPr>
-          <p:cNvPr id="8" name="Billede 7">
+          <p:cNvPr id="3" name="Billede 2" descr="Et billede, der indeholder skærmbillede&#10;&#10;Automatisk genereret beskrivelse">
             <a:extLst>
               <a:ext uri="{FF2B5EF4-FFF2-40B4-BE49-F238E27FC236}">
-                <a16:creationId xmlns:a16="http://schemas.microsoft.com/office/drawing/2014/main" id="{05958070-F1A5-8C4E-B6A5-4317A65D3A62}"/>
+                <a16:creationId xmlns:a16="http://schemas.microsoft.com/office/drawing/2014/main" id="{131CD7E0-5A0A-7C4F-B5D0-D69C75C756A6}"/>
               </a:ext>
             </a:extLst>
           </p:cNvPr>
@@ -25573,20 +28032,21 @@
           <p:nvPr/>
         </p:nvPicPr>
         <p:blipFill>
-          <a:blip r:embed="rId5">
+          <a:blip r:embed="rId4">
             <a:extLst>
               <a:ext uri="{28A0092B-C50C-407E-A947-70E740481C1C}">
                 <a14:useLocalDpi xmlns:a14="http://schemas.microsoft.com/office/drawing/2010/main" val="0"/>
               </a:ext>
             </a:extLst>
           </a:blip>
-          <a:srcRect/>
-          <a:stretch/>
+          <a:stretch>
+            <a:fillRect/>
+          </a:stretch>
         </p:blipFill>
         <p:spPr>
           <a:xfrm>
-            <a:off x="4920714" y="3429000"/>
-            <a:ext cx="2350572" cy="2369327"/>
+            <a:off x="5321299" y="625475"/>
+            <a:ext cx="6032500" cy="5867400"/>
           </a:xfrm>
           <a:prstGeom prst="rect">
             <a:avLst/>
@@ -25596,7 +28056,7 @@
     </p:spTree>
     <p:extLst>
       <p:ext uri="{BB962C8B-B14F-4D97-AF65-F5344CB8AC3E}">
-        <p14:creationId xmlns:p14="http://schemas.microsoft.com/office/powerpoint/2010/main" val="2831947930"/>
+        <p14:creationId xmlns:p14="http://schemas.microsoft.com/office/powerpoint/2010/main" val="2609978618"/>
       </p:ext>
     </p:extLst>
   </p:cSld>
@@ -26103,18 +28563,18 @@
 </file>
 
 <file path=customXml/item1.xml><?xml version="1.0" encoding="utf-8"?>
+<p:properties xmlns:p="http://schemas.microsoft.com/office/2006/metadata/properties" xmlns:xsi="http://www.w3.org/2001/XMLSchema-instance" xmlns:pc="http://schemas.microsoft.com/office/infopath/2007/PartnerControls">
+  <documentManagement/>
+</p:properties>
+</file>
+
+<file path=customXml/item2.xml><?xml version="1.0" encoding="utf-8"?>
 <?mso-contentType ?>
 <FormTemplates xmlns="http://schemas.microsoft.com/sharepoint/v3/contenttype/forms">
   <Display>DocumentLibraryForm</Display>
   <Edit>DocumentLibraryForm</Edit>
   <New>DocumentLibraryForm</New>
 </FormTemplates>
-</file>
-
-<file path=customXml/item2.xml><?xml version="1.0" encoding="utf-8"?>
-<p:properties xmlns:p="http://schemas.microsoft.com/office/2006/metadata/properties" xmlns:xsi="http://www.w3.org/2001/XMLSchema-instance" xmlns:pc="http://schemas.microsoft.com/office/infopath/2007/PartnerControls">
-  <documentManagement/>
-</p:properties>
 </file>
 
 <file path=customXml/item3.xml><?xml version="1.0" encoding="utf-8"?>
@@ -26276,14 +28736,6 @@
 </file>
 
 <file path=customXml/itemProps1.xml><?xml version="1.0" encoding="utf-8"?>
-<ds:datastoreItem xmlns:ds="http://schemas.openxmlformats.org/officeDocument/2006/customXml" ds:itemID="{F3E0AA88-FEA1-4142-9658-633D246C548A}">
-  <ds:schemaRefs>
-    <ds:schemaRef ds:uri="http://schemas.microsoft.com/sharepoint/v3/contenttype/forms"/>
-  </ds:schemaRefs>
-</ds:datastoreItem>
-</file>
-
-<file path=customXml/itemProps2.xml><?xml version="1.0" encoding="utf-8"?>
 <ds:datastoreItem xmlns:ds="http://schemas.openxmlformats.org/officeDocument/2006/customXml" ds:itemID="{F4AB53BE-832E-4760-A691-967F3BEFC84A}">
   <ds:schemaRefs>
     <ds:schemaRef ds:uri="e7042a3e-177d-4746-859a-bfd76803216a"/>
@@ -26295,6 +28747,14 @@
     <ds:schemaRef ds:uri="http://schemas.microsoft.com/office/infopath/2007/PartnerControls"/>
     <ds:schemaRef ds:uri="http://schemas.openxmlformats.org/package/2006/metadata/core-properties"/>
     <ds:schemaRef ds:uri="http://www.w3.org/XML/1998/namespace"/>
+  </ds:schemaRefs>
+</ds:datastoreItem>
+</file>
+
+<file path=customXml/itemProps2.xml><?xml version="1.0" encoding="utf-8"?>
+<ds:datastoreItem xmlns:ds="http://schemas.openxmlformats.org/officeDocument/2006/customXml" ds:itemID="{F3E0AA88-FEA1-4142-9658-633D246C548A}">
+  <ds:schemaRefs>
+    <ds:schemaRef ds:uri="http://schemas.microsoft.com/sharepoint/v3/contenttype/forms"/>
   </ds:schemaRefs>
 </ds:datastoreItem>
 </file>

</xml_diff>